<commit_message>
add epoch for alexnet
</commit_message>
<xml_diff>
--- a/BSD_Figures.pptx
+++ b/BSD_Figures.pptx
@@ -5,7 +5,7 @@
     <p:sldMasterId id="2147483648" r:id="rId1"/>
   </p:sldMasterIdLst>
   <p:notesMasterIdLst>
-    <p:notesMasterId r:id="rId67"/>
+    <p:notesMasterId r:id="rId75"/>
   </p:notesMasterIdLst>
   <p:sldIdLst>
     <p:sldId id="276" r:id="rId2"/>
@@ -73,6 +73,14 @@
     <p:sldId id="280" r:id="rId64"/>
     <p:sldId id="259" r:id="rId65"/>
     <p:sldId id="270" r:id="rId66"/>
+    <p:sldId id="333" r:id="rId67"/>
+    <p:sldId id="334" r:id="rId68"/>
+    <p:sldId id="335" r:id="rId69"/>
+    <p:sldId id="336" r:id="rId70"/>
+    <p:sldId id="337" r:id="rId71"/>
+    <p:sldId id="338" r:id="rId72"/>
+    <p:sldId id="339" r:id="rId73"/>
+    <p:sldId id="340" r:id="rId74"/>
   </p:sldIdLst>
   <p:sldSz cx="12192000" cy="6858000"/>
   <p:notesSz cx="6858000" cy="9144000"/>
@@ -27421,14 +27429,14 @@
           <p:nvPr>
             <p:extLst>
               <p:ext uri="{D42A27DB-BD31-4B8C-83A1-F6EECF244321}">
-                <p14:modId xmlns:p14="http://schemas.microsoft.com/office/powerpoint/2010/main" val="1981794565"/>
+                <p14:modId xmlns:p14="http://schemas.microsoft.com/office/powerpoint/2010/main" val="3289834981"/>
               </p:ext>
             </p:extLst>
           </p:nvPr>
         </p:nvGraphicFramePr>
         <p:xfrm>
           <a:off x="1170038" y="1873907"/>
-          <a:ext cx="9792930" cy="3221364"/>
+          <a:ext cx="9792930" cy="2452376"/>
         </p:xfrm>
         <a:graphic>
           <a:graphicData uri="http://schemas.openxmlformats.org/drawingml/2006/table">
@@ -27928,14 +27936,17 @@
                     <a:lstStyle/>
                     <a:p>
                       <a:pPr algn="ctr"/>
-                      <a:endParaRPr lang="en-US" sz="1800" kern="1200" dirty="0">
-                        <a:solidFill>
-                          <a:schemeClr val="tx1"/>
-                        </a:solidFill>
-                        <a:latin typeface="Times" pitchFamily="2" charset="0"/>
-                        <a:ea typeface="+mn-ea"/>
-                        <a:cs typeface="+mn-cs"/>
-                      </a:endParaRPr>
+                      <a:r>
+                        <a:rPr lang="en-US" sz="1800" kern="1200" dirty="0">
+                          <a:solidFill>
+                            <a:schemeClr val="tx1"/>
+                          </a:solidFill>
+                          <a:latin typeface="Times" pitchFamily="2" charset="0"/>
+                          <a:ea typeface="+mn-ea"/>
+                          <a:cs typeface="+mn-cs"/>
+                        </a:rPr>
+                        <a:t>72.42%</a:t>
+                      </a:r>
                     </a:p>
                   </a:txBody>
                   <a:tcPr/>
@@ -27946,14 +27957,17 @@
                     <a:lstStyle/>
                     <a:p>
                       <a:pPr algn="ctr"/>
-                      <a:endParaRPr lang="en-US" sz="1800" kern="1200" dirty="0">
-                        <a:solidFill>
-                          <a:schemeClr val="tx1"/>
-                        </a:solidFill>
-                        <a:latin typeface="Times" pitchFamily="2" charset="0"/>
-                        <a:ea typeface="+mn-ea"/>
-                        <a:cs typeface="+mn-cs"/>
-                      </a:endParaRPr>
+                      <a:r>
+                        <a:rPr lang="en-US" sz="1800" kern="1200" dirty="0">
+                          <a:solidFill>
+                            <a:schemeClr val="tx1"/>
+                          </a:solidFill>
+                          <a:latin typeface="Times" pitchFamily="2" charset="0"/>
+                          <a:ea typeface="+mn-ea"/>
+                          <a:cs typeface="+mn-cs"/>
+                        </a:rPr>
+                        <a:t>81.65%</a:t>
+                      </a:r>
                     </a:p>
                   </a:txBody>
                   <a:tcPr/>
@@ -27964,14 +27978,17 @@
                     <a:lstStyle/>
                     <a:p>
                       <a:pPr algn="ctr"/>
-                      <a:endParaRPr lang="en-US" sz="1800" kern="1200" dirty="0">
-                        <a:solidFill>
-                          <a:schemeClr val="tx1"/>
-                        </a:solidFill>
-                        <a:latin typeface="Times" pitchFamily="2" charset="0"/>
-                        <a:ea typeface="+mn-ea"/>
-                        <a:cs typeface="+mn-cs"/>
-                      </a:endParaRPr>
+                      <a:r>
+                        <a:rPr lang="en-US" sz="1800" kern="1200" dirty="0">
+                          <a:solidFill>
+                            <a:schemeClr val="tx1"/>
+                          </a:solidFill>
+                          <a:latin typeface="Times" pitchFamily="2" charset="0"/>
+                          <a:ea typeface="+mn-ea"/>
+                          <a:cs typeface="+mn-cs"/>
+                        </a:rPr>
+                        <a:t>71.4%</a:t>
+                      </a:r>
                     </a:p>
                   </a:txBody>
                   <a:tcPr/>
@@ -27982,14 +27999,17 @@
                     <a:lstStyle/>
                     <a:p>
                       <a:pPr algn="ctr"/>
-                      <a:endParaRPr lang="en-US" sz="1800" kern="1200" dirty="0">
-                        <a:solidFill>
-                          <a:schemeClr val="tx1"/>
-                        </a:solidFill>
-                        <a:latin typeface="Times" pitchFamily="2" charset="0"/>
-                        <a:ea typeface="+mn-ea"/>
-                        <a:cs typeface="+mn-cs"/>
-                      </a:endParaRPr>
+                      <a:r>
+                        <a:rPr lang="en-US" sz="1800" kern="1200" dirty="0">
+                          <a:solidFill>
+                            <a:schemeClr val="tx1"/>
+                          </a:solidFill>
+                          <a:latin typeface="Times" pitchFamily="2" charset="0"/>
+                          <a:ea typeface="+mn-ea"/>
+                          <a:cs typeface="+mn-cs"/>
+                        </a:rPr>
+                        <a:t>81.34%</a:t>
+                      </a:r>
                     </a:p>
                   </a:txBody>
                   <a:tcPr/>
@@ -28245,9 +28265,12 @@
                     <a:lstStyle/>
                     <a:p>
                       <a:pPr algn="ctr"/>
-                      <a:endParaRPr lang="en-US" dirty="0">
-                        <a:latin typeface="Times" pitchFamily="2" charset="0"/>
-                      </a:endParaRPr>
+                      <a:r>
+                        <a:rPr lang="en-US" dirty="0">
+                          <a:latin typeface="Times" pitchFamily="2" charset="0"/>
+                        </a:rPr>
+                        <a:t>80.84%</a:t>
+                      </a:r>
                     </a:p>
                   </a:txBody>
                   <a:tcPr/>
@@ -28258,9 +28281,12 @@
                     <a:lstStyle/>
                     <a:p>
                       <a:pPr algn="ctr"/>
-                      <a:endParaRPr lang="en-US" dirty="0">
-                        <a:latin typeface="Times" pitchFamily="2" charset="0"/>
-                      </a:endParaRPr>
+                      <a:r>
+                        <a:rPr lang="en-US" dirty="0">
+                          <a:latin typeface="Times" pitchFamily="2" charset="0"/>
+                        </a:rPr>
+                        <a:t>86.19%</a:t>
+                      </a:r>
                     </a:p>
                   </a:txBody>
                   <a:tcPr/>
@@ -28271,9 +28297,12 @@
                     <a:lstStyle/>
                     <a:p>
                       <a:pPr algn="ctr"/>
-                      <a:endParaRPr lang="en-US" dirty="0">
-                        <a:latin typeface="Times" pitchFamily="2" charset="0"/>
-                      </a:endParaRPr>
+                      <a:r>
+                        <a:rPr lang="en-US" dirty="0">
+                          <a:latin typeface="Times" pitchFamily="2" charset="0"/>
+                        </a:rPr>
+                        <a:t>82.04%</a:t>
+                      </a:r>
                     </a:p>
                   </a:txBody>
                   <a:tcPr/>
@@ -28284,9 +28313,12 @@
                     <a:lstStyle/>
                     <a:p>
                       <a:pPr algn="ctr"/>
-                      <a:endParaRPr lang="en-US" dirty="0">
-                        <a:latin typeface="Times" pitchFamily="2" charset="0"/>
-                      </a:endParaRPr>
+                      <a:r>
+                        <a:rPr lang="en-US" dirty="0">
+                          <a:latin typeface="Times" pitchFamily="2" charset="0"/>
+                        </a:rPr>
+                        <a:t>86.67%</a:t>
+                      </a:r>
                     </a:p>
                   </a:txBody>
                   <a:tcPr/>
@@ -28294,255 +28326,6 @@
                 <a:extLst>
                   <a:ext uri="{0D108BD9-81ED-4DB2-BD59-A6C34878D82A}">
                     <a16:rowId xmlns:a16="http://schemas.microsoft.com/office/drawing/2014/main" val="1207095232"/>
-                  </a:ext>
-                </a:extLst>
-              </a:tr>
-              <a:tr h="384494">
-                <a:tc rowSpan="2">
-                  <a:txBody>
-                    <a:bodyPr/>
-                    <a:lstStyle/>
-                    <a:p>
-                      <a:pPr algn="ctr"/>
-                      <a:r>
-                        <a:rPr lang="en-US" dirty="0">
-                          <a:latin typeface="Times" pitchFamily="2" charset="0"/>
-                        </a:rPr>
-                        <a:t>Hudson River</a:t>
-                      </a:r>
-                    </a:p>
-                  </a:txBody>
-                  <a:tcPr anchor="ctr"/>
-                </a:tc>
-                <a:tc>
-                  <a:txBody>
-                    <a:bodyPr/>
-                    <a:lstStyle/>
-                    <a:p>
-                      <a:pPr algn="ctr"/>
-                      <a:r>
-                        <a:rPr lang="en-US" altLang="zh-CN" sz="1800" b="1" kern="1200" dirty="0">
-                          <a:solidFill>
-                            <a:schemeClr val="tx1"/>
-                          </a:solidFill>
-                          <a:latin typeface="+mn-lt"/>
-                          <a:ea typeface="+mn-ea"/>
-                          <a:cs typeface="+mn-cs"/>
-                        </a:rPr>
-                        <a:t>Whole</a:t>
-                      </a:r>
-                      <a:r>
-                        <a:rPr lang="zh-CN" altLang="en-US" sz="1800" b="1" kern="1200" dirty="0">
-                          <a:solidFill>
-                            <a:schemeClr val="tx1"/>
-                          </a:solidFill>
-                          <a:latin typeface="+mn-lt"/>
-                          <a:ea typeface="+mn-ea"/>
-                          <a:cs typeface="+mn-cs"/>
-                        </a:rPr>
-                        <a:t> </a:t>
-                      </a:r>
-                      <a:r>
-                        <a:rPr lang="en-US" altLang="zh-CN" sz="1800" b="1" kern="1200" dirty="0">
-                          <a:solidFill>
-                            <a:schemeClr val="tx1"/>
-                          </a:solidFill>
-                          <a:latin typeface="+mn-lt"/>
-                          <a:ea typeface="+mn-ea"/>
-                          <a:cs typeface="+mn-cs"/>
-                        </a:rPr>
-                        <a:t>area</a:t>
-                      </a:r>
-                      <a:endParaRPr lang="en-US" dirty="0">
-                        <a:latin typeface="Times" pitchFamily="2" charset="0"/>
-                      </a:endParaRPr>
-                    </a:p>
-                  </a:txBody>
-                  <a:tcPr/>
-                </a:tc>
-                <a:tc>
-                  <a:txBody>
-                    <a:bodyPr/>
-                    <a:lstStyle/>
-                    <a:p>
-                      <a:pPr algn="ctr"/>
-                      <a:endParaRPr lang="en-US" dirty="0">
-                        <a:latin typeface="Times" pitchFamily="2" charset="0"/>
-                      </a:endParaRPr>
-                    </a:p>
-                  </a:txBody>
-                  <a:tcPr/>
-                </a:tc>
-                <a:tc>
-                  <a:txBody>
-                    <a:bodyPr/>
-                    <a:lstStyle/>
-                    <a:p>
-                      <a:pPr algn="ctr"/>
-                      <a:endParaRPr lang="en-US" dirty="0">
-                        <a:latin typeface="Times" pitchFamily="2" charset="0"/>
-                      </a:endParaRPr>
-                    </a:p>
-                  </a:txBody>
-                  <a:tcPr/>
-                </a:tc>
-                <a:tc>
-                  <a:txBody>
-                    <a:bodyPr/>
-                    <a:lstStyle/>
-                    <a:p>
-                      <a:pPr algn="ctr"/>
-                      <a:endParaRPr lang="en-US" dirty="0">
-                        <a:latin typeface="Times" pitchFamily="2" charset="0"/>
-                      </a:endParaRPr>
-                    </a:p>
-                  </a:txBody>
-                  <a:tcPr/>
-                </a:tc>
-                <a:tc>
-                  <a:txBody>
-                    <a:bodyPr/>
-                    <a:lstStyle/>
-                    <a:p>
-                      <a:pPr algn="ctr"/>
-                      <a:endParaRPr lang="en-US" dirty="0">
-                        <a:latin typeface="Times" pitchFamily="2" charset="0"/>
-                      </a:endParaRPr>
-                    </a:p>
-                  </a:txBody>
-                  <a:tcPr/>
-                </a:tc>
-                <a:extLst>
-                  <a:ext uri="{0D108BD9-81ED-4DB2-BD59-A6C34878D82A}">
-                    <a16:rowId xmlns:a16="http://schemas.microsoft.com/office/drawing/2014/main" val="4103627438"/>
-                  </a:ext>
-                </a:extLst>
-              </a:tr>
-              <a:tr h="384494">
-                <a:tc vMerge="1">
-                  <a:txBody>
-                    <a:bodyPr/>
-                    <a:lstStyle/>
-                    <a:p>
-                      <a:pPr algn="ctr"/>
-                      <a:endParaRPr lang="en-US" dirty="0">
-                        <a:latin typeface="Times" pitchFamily="2" charset="0"/>
-                      </a:endParaRPr>
-                    </a:p>
-                  </a:txBody>
-                  <a:tcPr anchor="ctr"/>
-                </a:tc>
-                <a:tc>
-                  <a:txBody>
-                    <a:bodyPr/>
-                    <a:lstStyle/>
-                    <a:p>
-                      <a:pPr marL="0" marR="0" lvl="0" indent="0" algn="ctr" defTabSz="914400" rtl="0" eaLnBrk="1" fontAlgn="auto" latinLnBrk="0" hangingPunct="1">
-                        <a:lnSpc>
-                          <a:spcPct val="100000"/>
-                        </a:lnSpc>
-                        <a:spcBef>
-                          <a:spcPts val="0"/>
-                        </a:spcBef>
-                        <a:spcAft>
-                          <a:spcPts val="0"/>
-                        </a:spcAft>
-                        <a:buClrTx/>
-                        <a:buSzTx/>
-                        <a:buFontTx/>
-                        <a:buNone/>
-                        <a:tabLst/>
-                        <a:defRPr/>
-                      </a:pPr>
-                      <a:r>
-                        <a:rPr lang="zh-CN" altLang="en-US" sz="1800" b="1" kern="1200" dirty="0">
-                          <a:solidFill>
-                            <a:schemeClr val="tx1"/>
-                          </a:solidFill>
-                          <a:latin typeface="+mn-lt"/>
-                          <a:ea typeface="+mn-ea"/>
-                          <a:cs typeface="+mn-cs"/>
-                        </a:rPr>
-                        <a:t> </a:t>
-                      </a:r>
-                      <a:r>
-                        <a:rPr lang="en-US" altLang="zh-CN" sz="1800" b="1" kern="1200" dirty="0">
-                          <a:solidFill>
-                            <a:schemeClr val="tx1"/>
-                          </a:solidFill>
-                          <a:latin typeface="+mn-lt"/>
-                          <a:ea typeface="+mn-ea"/>
-                          <a:cs typeface="+mn-cs"/>
-                        </a:rPr>
-                        <a:t>test routes</a:t>
-                      </a:r>
-                      <a:endParaRPr lang="en-US" sz="1800" b="1" kern="1200" dirty="0">
-                        <a:solidFill>
-                          <a:schemeClr val="tx1"/>
-                        </a:solidFill>
-                        <a:latin typeface="+mn-lt"/>
-                        <a:ea typeface="+mn-ea"/>
-                        <a:cs typeface="+mn-cs"/>
-                      </a:endParaRPr>
-                    </a:p>
-                  </a:txBody>
-                  <a:tcPr/>
-                </a:tc>
-                <a:tc>
-                  <a:txBody>
-                    <a:bodyPr/>
-                    <a:lstStyle/>
-                    <a:p>
-                      <a:pPr algn="ctr"/>
-                      <a:endParaRPr lang="en-US" dirty="0">
-                        <a:latin typeface="Times" pitchFamily="2" charset="0"/>
-                      </a:endParaRPr>
-                    </a:p>
-                  </a:txBody>
-                  <a:tcPr/>
-                </a:tc>
-                <a:tc>
-                  <a:txBody>
-                    <a:bodyPr/>
-                    <a:lstStyle/>
-                    <a:p>
-                      <a:pPr algn="ctr"/>
-                      <a:endParaRPr lang="en-US" dirty="0">
-                        <a:latin typeface="Times" pitchFamily="2" charset="0"/>
-                      </a:endParaRPr>
-                    </a:p>
-                  </a:txBody>
-                  <a:tcPr/>
-                </a:tc>
-                <a:tc>
-                  <a:txBody>
-                    <a:bodyPr/>
-                    <a:lstStyle/>
-                    <a:p>
-                      <a:pPr algn="ctr"/>
-                      <a:endParaRPr lang="en-US" dirty="0">
-                        <a:latin typeface="Times" pitchFamily="2" charset="0"/>
-                      </a:endParaRPr>
-                    </a:p>
-                  </a:txBody>
-                  <a:tcPr/>
-                </a:tc>
-                <a:tc>
-                  <a:txBody>
-                    <a:bodyPr/>
-                    <a:lstStyle/>
-                    <a:p>
-                      <a:pPr algn="ctr"/>
-                      <a:endParaRPr lang="en-US" dirty="0">
-                        <a:latin typeface="Times" pitchFamily="2" charset="0"/>
-                      </a:endParaRPr>
-                    </a:p>
-                  </a:txBody>
-                  <a:tcPr/>
-                </a:tc>
-                <a:extLst>
-                  <a:ext uri="{0D108BD9-81ED-4DB2-BD59-A6C34878D82A}">
-                    <a16:rowId xmlns:a16="http://schemas.microsoft.com/office/drawing/2014/main" val="720484347"/>
                   </a:ext>
                 </a:extLst>
               </a:tr>
@@ -28633,14 +28416,14 @@
           <p:nvPr>
             <p:extLst>
               <p:ext uri="{D42A27DB-BD31-4B8C-83A1-F6EECF244321}">
-                <p14:modId xmlns:p14="http://schemas.microsoft.com/office/powerpoint/2010/main" val="1773838444"/>
+                <p14:modId xmlns:p14="http://schemas.microsoft.com/office/powerpoint/2010/main" val="3874114412"/>
               </p:ext>
             </p:extLst>
           </p:nvPr>
         </p:nvGraphicFramePr>
         <p:xfrm>
           <a:off x="1472421" y="2024130"/>
-          <a:ext cx="9368046" cy="3267396"/>
+          <a:ext cx="9368046" cy="2484060"/>
         </p:xfrm>
         <a:graphic>
           <a:graphicData uri="http://schemas.openxmlformats.org/drawingml/2006/table">
@@ -29080,9 +28863,12 @@
                     <a:lstStyle/>
                     <a:p>
                       <a:pPr algn="ctr"/>
-                      <a:endParaRPr lang="en-US" dirty="0">
-                        <a:latin typeface="Times" pitchFamily="2" charset="0"/>
-                      </a:endParaRPr>
+                      <a:r>
+                        <a:rPr lang="en-US" dirty="0">
+                          <a:latin typeface="Times" pitchFamily="2" charset="0"/>
+                        </a:rPr>
+                        <a:t>72.48%</a:t>
+                      </a:r>
                     </a:p>
                   </a:txBody>
                   <a:tcPr/>
@@ -29093,9 +28879,12 @@
                     <a:lstStyle/>
                     <a:p>
                       <a:pPr algn="ctr"/>
-                      <a:endParaRPr lang="en-US" dirty="0">
-                        <a:latin typeface="Times" pitchFamily="2" charset="0"/>
-                      </a:endParaRPr>
+                      <a:r>
+                        <a:rPr lang="en-US" dirty="0">
+                          <a:latin typeface="Times" pitchFamily="2" charset="0"/>
+                        </a:rPr>
+                        <a:t>71.54%</a:t>
+                      </a:r>
                     </a:p>
                   </a:txBody>
                   <a:tcPr/>
@@ -29106,9 +28895,12 @@
                     <a:lstStyle/>
                     <a:p>
                       <a:pPr algn="ctr"/>
-                      <a:endParaRPr lang="en-US" dirty="0">
-                        <a:latin typeface="Times" pitchFamily="2" charset="0"/>
-                      </a:endParaRPr>
+                      <a:r>
+                        <a:rPr lang="en-US" dirty="0">
+                          <a:latin typeface="Times" pitchFamily="2" charset="0"/>
+                        </a:rPr>
+                        <a:t>81.92%</a:t>
+                      </a:r>
                     </a:p>
                   </a:txBody>
                   <a:tcPr/>
@@ -29119,9 +28911,12 @@
                     <a:lstStyle/>
                     <a:p>
                       <a:pPr algn="ctr"/>
-                      <a:endParaRPr lang="en-US" dirty="0">
-                        <a:latin typeface="Times" pitchFamily="2" charset="0"/>
-                      </a:endParaRPr>
+                      <a:r>
+                        <a:rPr lang="en-US" dirty="0">
+                          <a:latin typeface="Times" pitchFamily="2" charset="0"/>
+                        </a:rPr>
+                        <a:t>81.11%</a:t>
+                      </a:r>
                     </a:p>
                   </a:txBody>
                   <a:tcPr/>
@@ -29401,9 +29196,12 @@
                     <a:lstStyle/>
                     <a:p>
                       <a:pPr algn="ctr"/>
-                      <a:endParaRPr lang="en-US" dirty="0">
-                        <a:latin typeface="Times" pitchFamily="2" charset="0"/>
-                      </a:endParaRPr>
+                      <a:r>
+                        <a:rPr lang="en-US" dirty="0">
+                          <a:latin typeface="Times" pitchFamily="2" charset="0"/>
+                        </a:rPr>
+                        <a:t>82.3%</a:t>
+                      </a:r>
                     </a:p>
                   </a:txBody>
                   <a:tcPr/>
@@ -29414,9 +29212,12 @@
                     <a:lstStyle/>
                     <a:p>
                       <a:pPr algn="ctr"/>
-                      <a:endParaRPr lang="en-US" dirty="0">
-                        <a:latin typeface="Times" pitchFamily="2" charset="0"/>
-                      </a:endParaRPr>
+                      <a:r>
+                        <a:rPr lang="en-US" dirty="0">
+                          <a:latin typeface="Times" pitchFamily="2" charset="0"/>
+                        </a:rPr>
+                        <a:t>81.06%</a:t>
+                      </a:r>
                     </a:p>
                   </a:txBody>
                   <a:tcPr/>
@@ -29427,9 +29228,12 @@
                     <a:lstStyle/>
                     <a:p>
                       <a:pPr algn="ctr"/>
-                      <a:endParaRPr lang="en-US" dirty="0">
-                        <a:latin typeface="Times" pitchFamily="2" charset="0"/>
-                      </a:endParaRPr>
+                      <a:r>
+                        <a:rPr lang="en-US" dirty="0">
+                          <a:latin typeface="Times" pitchFamily="2" charset="0"/>
+                        </a:rPr>
+                        <a:t>87.08%</a:t>
+                      </a:r>
                     </a:p>
                   </a:txBody>
                   <a:tcPr/>
@@ -29440,9 +29244,12 @@
                     <a:lstStyle/>
                     <a:p>
                       <a:pPr algn="ctr"/>
-                      <a:endParaRPr lang="en-US" dirty="0">
-                        <a:latin typeface="Times" pitchFamily="2" charset="0"/>
-                      </a:endParaRPr>
+                      <a:r>
+                        <a:rPr lang="en-US" dirty="0">
+                          <a:latin typeface="Times" pitchFamily="2" charset="0"/>
+                        </a:rPr>
+                        <a:t>85.94%</a:t>
+                      </a:r>
                     </a:p>
                   </a:txBody>
                   <a:tcPr/>
@@ -29450,255 +29257,6 @@
                 <a:extLst>
                   <a:ext uri="{0D108BD9-81ED-4DB2-BD59-A6C34878D82A}">
                     <a16:rowId xmlns:a16="http://schemas.microsoft.com/office/drawing/2014/main" val="2521364167"/>
-                  </a:ext>
-                </a:extLst>
-              </a:tr>
-              <a:tr h="391668">
-                <a:tc rowSpan="2">
-                  <a:txBody>
-                    <a:bodyPr/>
-                    <a:lstStyle/>
-                    <a:p>
-                      <a:pPr algn="ctr"/>
-                      <a:r>
-                        <a:rPr lang="en-US" dirty="0">
-                          <a:latin typeface="Times" pitchFamily="2" charset="0"/>
-                        </a:rPr>
-                        <a:t>Hudson River</a:t>
-                      </a:r>
-                    </a:p>
-                  </a:txBody>
-                  <a:tcPr anchor="ctr"/>
-                </a:tc>
-                <a:tc>
-                  <a:txBody>
-                    <a:bodyPr/>
-                    <a:lstStyle/>
-                    <a:p>
-                      <a:pPr algn="ctr"/>
-                      <a:r>
-                        <a:rPr lang="en-US" altLang="zh-CN" sz="1800" b="1" kern="1200" dirty="0">
-                          <a:solidFill>
-                            <a:schemeClr val="tx1"/>
-                          </a:solidFill>
-                          <a:latin typeface="+mn-lt"/>
-                          <a:ea typeface="+mn-ea"/>
-                          <a:cs typeface="+mn-cs"/>
-                        </a:rPr>
-                        <a:t>Whole</a:t>
-                      </a:r>
-                      <a:r>
-                        <a:rPr lang="zh-CN" altLang="en-US" sz="1800" b="1" kern="1200" dirty="0">
-                          <a:solidFill>
-                            <a:schemeClr val="tx1"/>
-                          </a:solidFill>
-                          <a:latin typeface="+mn-lt"/>
-                          <a:ea typeface="+mn-ea"/>
-                          <a:cs typeface="+mn-cs"/>
-                        </a:rPr>
-                        <a:t> </a:t>
-                      </a:r>
-                      <a:r>
-                        <a:rPr lang="en-US" altLang="zh-CN" sz="1800" b="1" kern="1200" dirty="0">
-                          <a:solidFill>
-                            <a:schemeClr val="tx1"/>
-                          </a:solidFill>
-                          <a:latin typeface="+mn-lt"/>
-                          <a:ea typeface="+mn-ea"/>
-                          <a:cs typeface="+mn-cs"/>
-                        </a:rPr>
-                        <a:t>area</a:t>
-                      </a:r>
-                      <a:endParaRPr lang="en-US" dirty="0">
-                        <a:latin typeface="Times" pitchFamily="2" charset="0"/>
-                      </a:endParaRPr>
-                    </a:p>
-                  </a:txBody>
-                  <a:tcPr/>
-                </a:tc>
-                <a:tc>
-                  <a:txBody>
-                    <a:bodyPr/>
-                    <a:lstStyle/>
-                    <a:p>
-                      <a:pPr algn="ctr"/>
-                      <a:endParaRPr lang="en-US" dirty="0">
-                        <a:latin typeface="Times" pitchFamily="2" charset="0"/>
-                      </a:endParaRPr>
-                    </a:p>
-                  </a:txBody>
-                  <a:tcPr/>
-                </a:tc>
-                <a:tc>
-                  <a:txBody>
-                    <a:bodyPr/>
-                    <a:lstStyle/>
-                    <a:p>
-                      <a:pPr algn="ctr"/>
-                      <a:endParaRPr lang="en-US" dirty="0">
-                        <a:latin typeface="Times" pitchFamily="2" charset="0"/>
-                      </a:endParaRPr>
-                    </a:p>
-                  </a:txBody>
-                  <a:tcPr/>
-                </a:tc>
-                <a:tc>
-                  <a:txBody>
-                    <a:bodyPr/>
-                    <a:lstStyle/>
-                    <a:p>
-                      <a:pPr algn="ctr"/>
-                      <a:endParaRPr lang="en-US" dirty="0">
-                        <a:latin typeface="Times" pitchFamily="2" charset="0"/>
-                      </a:endParaRPr>
-                    </a:p>
-                  </a:txBody>
-                  <a:tcPr/>
-                </a:tc>
-                <a:tc>
-                  <a:txBody>
-                    <a:bodyPr/>
-                    <a:lstStyle/>
-                    <a:p>
-                      <a:pPr algn="ctr"/>
-                      <a:endParaRPr lang="en-US" dirty="0">
-                        <a:latin typeface="Times" pitchFamily="2" charset="0"/>
-                      </a:endParaRPr>
-                    </a:p>
-                  </a:txBody>
-                  <a:tcPr/>
-                </a:tc>
-                <a:extLst>
-                  <a:ext uri="{0D108BD9-81ED-4DB2-BD59-A6C34878D82A}">
-                    <a16:rowId xmlns:a16="http://schemas.microsoft.com/office/drawing/2014/main" val="3296006206"/>
-                  </a:ext>
-                </a:extLst>
-              </a:tr>
-              <a:tr h="391668">
-                <a:tc vMerge="1">
-                  <a:txBody>
-                    <a:bodyPr/>
-                    <a:lstStyle/>
-                    <a:p>
-                      <a:pPr algn="ctr"/>
-                      <a:endParaRPr lang="en-US" dirty="0">
-                        <a:latin typeface="Times" pitchFamily="2" charset="0"/>
-                      </a:endParaRPr>
-                    </a:p>
-                  </a:txBody>
-                  <a:tcPr anchor="ctr"/>
-                </a:tc>
-                <a:tc>
-                  <a:txBody>
-                    <a:bodyPr/>
-                    <a:lstStyle/>
-                    <a:p>
-                      <a:pPr marL="0" marR="0" lvl="0" indent="0" algn="ctr" defTabSz="914400" rtl="0" eaLnBrk="1" fontAlgn="auto" latinLnBrk="0" hangingPunct="1">
-                        <a:lnSpc>
-                          <a:spcPct val="100000"/>
-                        </a:lnSpc>
-                        <a:spcBef>
-                          <a:spcPts val="0"/>
-                        </a:spcBef>
-                        <a:spcAft>
-                          <a:spcPts val="0"/>
-                        </a:spcAft>
-                        <a:buClrTx/>
-                        <a:buSzTx/>
-                        <a:buFontTx/>
-                        <a:buNone/>
-                        <a:tabLst/>
-                        <a:defRPr/>
-                      </a:pPr>
-                      <a:r>
-                        <a:rPr lang="zh-CN" altLang="en-US" sz="1800" b="1" kern="1200" dirty="0">
-                          <a:solidFill>
-                            <a:schemeClr val="tx1"/>
-                          </a:solidFill>
-                          <a:latin typeface="+mn-lt"/>
-                          <a:ea typeface="+mn-ea"/>
-                          <a:cs typeface="+mn-cs"/>
-                        </a:rPr>
-                        <a:t> </a:t>
-                      </a:r>
-                      <a:r>
-                        <a:rPr lang="en-US" altLang="zh-CN" sz="1800" b="1" kern="1200" dirty="0">
-                          <a:solidFill>
-                            <a:schemeClr val="tx1"/>
-                          </a:solidFill>
-                          <a:latin typeface="+mn-lt"/>
-                          <a:ea typeface="+mn-ea"/>
-                          <a:cs typeface="+mn-cs"/>
-                        </a:rPr>
-                        <a:t>test routes</a:t>
-                      </a:r>
-                      <a:endParaRPr lang="en-US" sz="1800" b="1" kern="1200" dirty="0">
-                        <a:solidFill>
-                          <a:schemeClr val="tx1"/>
-                        </a:solidFill>
-                        <a:latin typeface="+mn-lt"/>
-                        <a:ea typeface="+mn-ea"/>
-                        <a:cs typeface="+mn-cs"/>
-                      </a:endParaRPr>
-                    </a:p>
-                  </a:txBody>
-                  <a:tcPr/>
-                </a:tc>
-                <a:tc>
-                  <a:txBody>
-                    <a:bodyPr/>
-                    <a:lstStyle/>
-                    <a:p>
-                      <a:pPr algn="ctr"/>
-                      <a:endParaRPr lang="en-US" dirty="0">
-                        <a:latin typeface="Times" pitchFamily="2" charset="0"/>
-                      </a:endParaRPr>
-                    </a:p>
-                  </a:txBody>
-                  <a:tcPr/>
-                </a:tc>
-                <a:tc>
-                  <a:txBody>
-                    <a:bodyPr/>
-                    <a:lstStyle/>
-                    <a:p>
-                      <a:pPr algn="ctr"/>
-                      <a:endParaRPr lang="en-US" dirty="0">
-                        <a:latin typeface="Times" pitchFamily="2" charset="0"/>
-                      </a:endParaRPr>
-                    </a:p>
-                  </a:txBody>
-                  <a:tcPr/>
-                </a:tc>
-                <a:tc>
-                  <a:txBody>
-                    <a:bodyPr/>
-                    <a:lstStyle/>
-                    <a:p>
-                      <a:pPr algn="ctr"/>
-                      <a:endParaRPr lang="en-US" dirty="0">
-                        <a:latin typeface="Times" pitchFamily="2" charset="0"/>
-                      </a:endParaRPr>
-                    </a:p>
-                  </a:txBody>
-                  <a:tcPr/>
-                </a:tc>
-                <a:tc>
-                  <a:txBody>
-                    <a:bodyPr/>
-                    <a:lstStyle/>
-                    <a:p>
-                      <a:pPr algn="ctr"/>
-                      <a:endParaRPr lang="en-US" dirty="0">
-                        <a:latin typeface="Times" pitchFamily="2" charset="0"/>
-                      </a:endParaRPr>
-                    </a:p>
-                  </a:txBody>
-                  <a:tcPr/>
-                </a:tc>
-                <a:extLst>
-                  <a:ext uri="{0D108BD9-81ED-4DB2-BD59-A6C34878D82A}">
-                    <a16:rowId xmlns:a16="http://schemas.microsoft.com/office/drawing/2014/main" val="188873265"/>
                   </a:ext>
                 </a:extLst>
               </a:tr>
@@ -29922,14 +29480,14 @@
           <p:nvPr>
             <p:extLst>
               <p:ext uri="{D42A27DB-BD31-4B8C-83A1-F6EECF244321}">
-                <p14:modId xmlns:p14="http://schemas.microsoft.com/office/powerpoint/2010/main" val="3940891101"/>
+                <p14:modId xmlns:p14="http://schemas.microsoft.com/office/powerpoint/2010/main" val="4143741699"/>
               </p:ext>
             </p:extLst>
           </p:nvPr>
         </p:nvGraphicFramePr>
         <p:xfrm>
           <a:off x="1170038" y="1873907"/>
-          <a:ext cx="9792930" cy="3221364"/>
+          <a:ext cx="9792930" cy="2452376"/>
         </p:xfrm>
         <a:graphic>
           <a:graphicData uri="http://schemas.openxmlformats.org/drawingml/2006/table">
@@ -30429,14 +29987,17 @@
                     <a:lstStyle/>
                     <a:p>
                       <a:pPr algn="ctr"/>
-                      <a:endParaRPr lang="en-US" sz="1800" kern="1200" dirty="0">
-                        <a:solidFill>
-                          <a:schemeClr val="tx1"/>
-                        </a:solidFill>
-                        <a:latin typeface="Times" pitchFamily="2" charset="0"/>
-                        <a:ea typeface="+mn-ea"/>
-                        <a:cs typeface="+mn-cs"/>
-                      </a:endParaRPr>
+                      <a:r>
+                        <a:rPr lang="en-US" sz="1800" kern="1200" dirty="0">
+                          <a:solidFill>
+                            <a:schemeClr val="tx1"/>
+                          </a:solidFill>
+                          <a:latin typeface="Times" pitchFamily="2" charset="0"/>
+                          <a:ea typeface="+mn-ea"/>
+                          <a:cs typeface="+mn-cs"/>
+                        </a:rPr>
+                        <a:t>70.32%</a:t>
+                      </a:r>
                     </a:p>
                   </a:txBody>
                   <a:tcPr/>
@@ -30447,14 +30008,17 @@
                     <a:lstStyle/>
                     <a:p>
                       <a:pPr algn="ctr"/>
-                      <a:endParaRPr lang="en-US" sz="1800" kern="1200" dirty="0">
-                        <a:solidFill>
-                          <a:schemeClr val="tx1"/>
-                        </a:solidFill>
-                        <a:latin typeface="Times" pitchFamily="2" charset="0"/>
-                        <a:ea typeface="+mn-ea"/>
-                        <a:cs typeface="+mn-cs"/>
-                      </a:endParaRPr>
+                      <a:r>
+                        <a:rPr lang="en-US" sz="1800" kern="1200" dirty="0">
+                          <a:solidFill>
+                            <a:schemeClr val="tx1"/>
+                          </a:solidFill>
+                          <a:latin typeface="Times" pitchFamily="2" charset="0"/>
+                          <a:ea typeface="+mn-ea"/>
+                          <a:cs typeface="+mn-cs"/>
+                        </a:rPr>
+                        <a:t>81.81%</a:t>
+                      </a:r>
                     </a:p>
                   </a:txBody>
                   <a:tcPr/>
@@ -30465,14 +30029,17 @@
                     <a:lstStyle/>
                     <a:p>
                       <a:pPr algn="ctr"/>
-                      <a:endParaRPr lang="en-US" sz="1800" kern="1200" dirty="0">
-                        <a:solidFill>
-                          <a:schemeClr val="tx1"/>
-                        </a:solidFill>
-                        <a:latin typeface="Times" pitchFamily="2" charset="0"/>
-                        <a:ea typeface="+mn-ea"/>
-                        <a:cs typeface="+mn-cs"/>
-                      </a:endParaRPr>
+                      <a:r>
+                        <a:rPr lang="en-US" sz="1800" kern="1200" dirty="0">
+                          <a:solidFill>
+                            <a:schemeClr val="tx1"/>
+                          </a:solidFill>
+                          <a:latin typeface="Times" pitchFamily="2" charset="0"/>
+                          <a:ea typeface="+mn-ea"/>
+                          <a:cs typeface="+mn-cs"/>
+                        </a:rPr>
+                        <a:t>72.96%</a:t>
+                      </a:r>
                     </a:p>
                   </a:txBody>
                   <a:tcPr/>
@@ -30483,14 +30050,17 @@
                     <a:lstStyle/>
                     <a:p>
                       <a:pPr algn="ctr"/>
-                      <a:endParaRPr lang="en-US" sz="1800" kern="1200" dirty="0">
-                        <a:solidFill>
-                          <a:schemeClr val="tx1"/>
-                        </a:solidFill>
-                        <a:latin typeface="Times" pitchFamily="2" charset="0"/>
-                        <a:ea typeface="+mn-ea"/>
-                        <a:cs typeface="+mn-cs"/>
-                      </a:endParaRPr>
+                      <a:r>
+                        <a:rPr lang="en-US" sz="1800" kern="1200" dirty="0">
+                          <a:solidFill>
+                            <a:schemeClr val="tx1"/>
+                          </a:solidFill>
+                          <a:latin typeface="Times" pitchFamily="2" charset="0"/>
+                          <a:ea typeface="+mn-ea"/>
+                          <a:cs typeface="+mn-cs"/>
+                        </a:rPr>
+                        <a:t>80.75%</a:t>
+                      </a:r>
                     </a:p>
                   </a:txBody>
                   <a:tcPr/>
@@ -30746,9 +30316,12 @@
                     <a:lstStyle/>
                     <a:p>
                       <a:pPr algn="ctr"/>
-                      <a:endParaRPr lang="en-US" dirty="0">
-                        <a:latin typeface="Times" pitchFamily="2" charset="0"/>
-                      </a:endParaRPr>
+                      <a:r>
+                        <a:rPr lang="en-US" dirty="0">
+                          <a:latin typeface="Times" pitchFamily="2" charset="0"/>
+                        </a:rPr>
+                        <a:t>82.24%</a:t>
+                      </a:r>
                     </a:p>
                   </a:txBody>
                   <a:tcPr/>
@@ -30759,9 +30332,12 @@
                     <a:lstStyle/>
                     <a:p>
                       <a:pPr algn="ctr"/>
-                      <a:endParaRPr lang="en-US" dirty="0">
-                        <a:latin typeface="Times" pitchFamily="2" charset="0"/>
-                      </a:endParaRPr>
+                      <a:r>
+                        <a:rPr lang="en-US" dirty="0">
+                          <a:latin typeface="Times" pitchFamily="2" charset="0"/>
+                        </a:rPr>
+                        <a:t>85.62%</a:t>
+                      </a:r>
                     </a:p>
                   </a:txBody>
                   <a:tcPr/>
@@ -30772,9 +30348,12 @@
                     <a:lstStyle/>
                     <a:p>
                       <a:pPr algn="ctr"/>
-                      <a:endParaRPr lang="en-US" dirty="0">
-                        <a:latin typeface="Times" pitchFamily="2" charset="0"/>
-                      </a:endParaRPr>
+                      <a:r>
+                        <a:rPr lang="en-US" dirty="0">
+                          <a:latin typeface="Times" pitchFamily="2" charset="0"/>
+                        </a:rPr>
+                        <a:t>82.4%</a:t>
+                      </a:r>
                     </a:p>
                   </a:txBody>
                   <a:tcPr/>
@@ -30785,9 +30364,12 @@
                     <a:lstStyle/>
                     <a:p>
                       <a:pPr algn="ctr"/>
-                      <a:endParaRPr lang="en-US" dirty="0">
-                        <a:latin typeface="Times" pitchFamily="2" charset="0"/>
-                      </a:endParaRPr>
+                      <a:r>
+                        <a:rPr lang="en-US" dirty="0">
+                          <a:latin typeface="Times" pitchFamily="2" charset="0"/>
+                        </a:rPr>
+                        <a:t>85.69%</a:t>
+                      </a:r>
                     </a:p>
                   </a:txBody>
                   <a:tcPr/>
@@ -30795,255 +30377,6 @@
                 <a:extLst>
                   <a:ext uri="{0D108BD9-81ED-4DB2-BD59-A6C34878D82A}">
                     <a16:rowId xmlns:a16="http://schemas.microsoft.com/office/drawing/2014/main" val="1207095232"/>
-                  </a:ext>
-                </a:extLst>
-              </a:tr>
-              <a:tr h="384494">
-                <a:tc rowSpan="2">
-                  <a:txBody>
-                    <a:bodyPr/>
-                    <a:lstStyle/>
-                    <a:p>
-                      <a:pPr algn="ctr"/>
-                      <a:r>
-                        <a:rPr lang="en-US" dirty="0">
-                          <a:latin typeface="Times" pitchFamily="2" charset="0"/>
-                        </a:rPr>
-                        <a:t>Hudson River</a:t>
-                      </a:r>
-                    </a:p>
-                  </a:txBody>
-                  <a:tcPr anchor="ctr"/>
-                </a:tc>
-                <a:tc>
-                  <a:txBody>
-                    <a:bodyPr/>
-                    <a:lstStyle/>
-                    <a:p>
-                      <a:pPr algn="ctr"/>
-                      <a:r>
-                        <a:rPr lang="en-US" altLang="zh-CN" sz="1800" b="1" kern="1200" dirty="0">
-                          <a:solidFill>
-                            <a:schemeClr val="tx1"/>
-                          </a:solidFill>
-                          <a:latin typeface="+mn-lt"/>
-                          <a:ea typeface="+mn-ea"/>
-                          <a:cs typeface="+mn-cs"/>
-                        </a:rPr>
-                        <a:t>Whole</a:t>
-                      </a:r>
-                      <a:r>
-                        <a:rPr lang="zh-CN" altLang="en-US" sz="1800" b="1" kern="1200" dirty="0">
-                          <a:solidFill>
-                            <a:schemeClr val="tx1"/>
-                          </a:solidFill>
-                          <a:latin typeface="+mn-lt"/>
-                          <a:ea typeface="+mn-ea"/>
-                          <a:cs typeface="+mn-cs"/>
-                        </a:rPr>
-                        <a:t> </a:t>
-                      </a:r>
-                      <a:r>
-                        <a:rPr lang="en-US" altLang="zh-CN" sz="1800" b="1" kern="1200" dirty="0">
-                          <a:solidFill>
-                            <a:schemeClr val="tx1"/>
-                          </a:solidFill>
-                          <a:latin typeface="+mn-lt"/>
-                          <a:ea typeface="+mn-ea"/>
-                          <a:cs typeface="+mn-cs"/>
-                        </a:rPr>
-                        <a:t>area</a:t>
-                      </a:r>
-                      <a:endParaRPr lang="en-US" dirty="0">
-                        <a:latin typeface="Times" pitchFamily="2" charset="0"/>
-                      </a:endParaRPr>
-                    </a:p>
-                  </a:txBody>
-                  <a:tcPr/>
-                </a:tc>
-                <a:tc>
-                  <a:txBody>
-                    <a:bodyPr/>
-                    <a:lstStyle/>
-                    <a:p>
-                      <a:pPr algn="ctr"/>
-                      <a:endParaRPr lang="en-US" dirty="0">
-                        <a:latin typeface="Times" pitchFamily="2" charset="0"/>
-                      </a:endParaRPr>
-                    </a:p>
-                  </a:txBody>
-                  <a:tcPr/>
-                </a:tc>
-                <a:tc>
-                  <a:txBody>
-                    <a:bodyPr/>
-                    <a:lstStyle/>
-                    <a:p>
-                      <a:pPr algn="ctr"/>
-                      <a:endParaRPr lang="en-US" dirty="0">
-                        <a:latin typeface="Times" pitchFamily="2" charset="0"/>
-                      </a:endParaRPr>
-                    </a:p>
-                  </a:txBody>
-                  <a:tcPr/>
-                </a:tc>
-                <a:tc>
-                  <a:txBody>
-                    <a:bodyPr/>
-                    <a:lstStyle/>
-                    <a:p>
-                      <a:pPr algn="ctr"/>
-                      <a:endParaRPr lang="en-US" dirty="0">
-                        <a:latin typeface="Times" pitchFamily="2" charset="0"/>
-                      </a:endParaRPr>
-                    </a:p>
-                  </a:txBody>
-                  <a:tcPr/>
-                </a:tc>
-                <a:tc>
-                  <a:txBody>
-                    <a:bodyPr/>
-                    <a:lstStyle/>
-                    <a:p>
-                      <a:pPr algn="ctr"/>
-                      <a:endParaRPr lang="en-US" dirty="0">
-                        <a:latin typeface="Times" pitchFamily="2" charset="0"/>
-                      </a:endParaRPr>
-                    </a:p>
-                  </a:txBody>
-                  <a:tcPr/>
-                </a:tc>
-                <a:extLst>
-                  <a:ext uri="{0D108BD9-81ED-4DB2-BD59-A6C34878D82A}">
-                    <a16:rowId xmlns:a16="http://schemas.microsoft.com/office/drawing/2014/main" val="4103627438"/>
-                  </a:ext>
-                </a:extLst>
-              </a:tr>
-              <a:tr h="384494">
-                <a:tc vMerge="1">
-                  <a:txBody>
-                    <a:bodyPr/>
-                    <a:lstStyle/>
-                    <a:p>
-                      <a:pPr algn="ctr"/>
-                      <a:endParaRPr lang="en-US" dirty="0">
-                        <a:latin typeface="Times" pitchFamily="2" charset="0"/>
-                      </a:endParaRPr>
-                    </a:p>
-                  </a:txBody>
-                  <a:tcPr anchor="ctr"/>
-                </a:tc>
-                <a:tc>
-                  <a:txBody>
-                    <a:bodyPr/>
-                    <a:lstStyle/>
-                    <a:p>
-                      <a:pPr marL="0" marR="0" lvl="0" indent="0" algn="ctr" defTabSz="914400" rtl="0" eaLnBrk="1" fontAlgn="auto" latinLnBrk="0" hangingPunct="1">
-                        <a:lnSpc>
-                          <a:spcPct val="100000"/>
-                        </a:lnSpc>
-                        <a:spcBef>
-                          <a:spcPts val="0"/>
-                        </a:spcBef>
-                        <a:spcAft>
-                          <a:spcPts val="0"/>
-                        </a:spcAft>
-                        <a:buClrTx/>
-                        <a:buSzTx/>
-                        <a:buFontTx/>
-                        <a:buNone/>
-                        <a:tabLst/>
-                        <a:defRPr/>
-                      </a:pPr>
-                      <a:r>
-                        <a:rPr lang="zh-CN" altLang="en-US" sz="1800" b="1" kern="1200" dirty="0">
-                          <a:solidFill>
-                            <a:schemeClr val="tx1"/>
-                          </a:solidFill>
-                          <a:latin typeface="+mn-lt"/>
-                          <a:ea typeface="+mn-ea"/>
-                          <a:cs typeface="+mn-cs"/>
-                        </a:rPr>
-                        <a:t> </a:t>
-                      </a:r>
-                      <a:r>
-                        <a:rPr lang="en-US" altLang="zh-CN" sz="1800" b="1" kern="1200" dirty="0">
-                          <a:solidFill>
-                            <a:schemeClr val="tx1"/>
-                          </a:solidFill>
-                          <a:latin typeface="+mn-lt"/>
-                          <a:ea typeface="+mn-ea"/>
-                          <a:cs typeface="+mn-cs"/>
-                        </a:rPr>
-                        <a:t>test routes</a:t>
-                      </a:r>
-                      <a:endParaRPr lang="en-US" sz="1800" b="1" kern="1200" dirty="0">
-                        <a:solidFill>
-                          <a:schemeClr val="tx1"/>
-                        </a:solidFill>
-                        <a:latin typeface="+mn-lt"/>
-                        <a:ea typeface="+mn-ea"/>
-                        <a:cs typeface="+mn-cs"/>
-                      </a:endParaRPr>
-                    </a:p>
-                  </a:txBody>
-                  <a:tcPr/>
-                </a:tc>
-                <a:tc>
-                  <a:txBody>
-                    <a:bodyPr/>
-                    <a:lstStyle/>
-                    <a:p>
-                      <a:pPr algn="ctr"/>
-                      <a:endParaRPr lang="en-US" dirty="0">
-                        <a:latin typeface="Times" pitchFamily="2" charset="0"/>
-                      </a:endParaRPr>
-                    </a:p>
-                  </a:txBody>
-                  <a:tcPr/>
-                </a:tc>
-                <a:tc>
-                  <a:txBody>
-                    <a:bodyPr/>
-                    <a:lstStyle/>
-                    <a:p>
-                      <a:pPr algn="ctr"/>
-                      <a:endParaRPr lang="en-US" dirty="0">
-                        <a:latin typeface="Times" pitchFamily="2" charset="0"/>
-                      </a:endParaRPr>
-                    </a:p>
-                  </a:txBody>
-                  <a:tcPr/>
-                </a:tc>
-                <a:tc>
-                  <a:txBody>
-                    <a:bodyPr/>
-                    <a:lstStyle/>
-                    <a:p>
-                      <a:pPr algn="ctr"/>
-                      <a:endParaRPr lang="en-US" dirty="0">
-                        <a:latin typeface="Times" pitchFamily="2" charset="0"/>
-                      </a:endParaRPr>
-                    </a:p>
-                  </a:txBody>
-                  <a:tcPr/>
-                </a:tc>
-                <a:tc>
-                  <a:txBody>
-                    <a:bodyPr/>
-                    <a:lstStyle/>
-                    <a:p>
-                      <a:pPr algn="ctr"/>
-                      <a:endParaRPr lang="en-US" dirty="0">
-                        <a:latin typeface="Times" pitchFamily="2" charset="0"/>
-                      </a:endParaRPr>
-                    </a:p>
-                  </a:txBody>
-                  <a:tcPr/>
-                </a:tc>
-                <a:extLst>
-                  <a:ext uri="{0D108BD9-81ED-4DB2-BD59-A6C34878D82A}">
-                    <a16:rowId xmlns:a16="http://schemas.microsoft.com/office/drawing/2014/main" val="720484347"/>
                   </a:ext>
                 </a:extLst>
               </a:tr>
@@ -31134,14 +30467,14 @@
           <p:nvPr>
             <p:extLst>
               <p:ext uri="{D42A27DB-BD31-4B8C-83A1-F6EECF244321}">
-                <p14:modId xmlns:p14="http://schemas.microsoft.com/office/powerpoint/2010/main" val="4188983545"/>
+                <p14:modId xmlns:p14="http://schemas.microsoft.com/office/powerpoint/2010/main" val="1548847292"/>
               </p:ext>
             </p:extLst>
           </p:nvPr>
         </p:nvGraphicFramePr>
         <p:xfrm>
           <a:off x="1472421" y="2024130"/>
-          <a:ext cx="9368046" cy="3267396"/>
+          <a:ext cx="9368046" cy="2484060"/>
         </p:xfrm>
         <a:graphic>
           <a:graphicData uri="http://schemas.openxmlformats.org/drawingml/2006/table">
@@ -31581,9 +30914,12 @@
                     <a:lstStyle/>
                     <a:p>
                       <a:pPr algn="ctr"/>
-                      <a:endParaRPr lang="en-US" dirty="0">
-                        <a:latin typeface="Times" pitchFamily="2" charset="0"/>
-                      </a:endParaRPr>
+                      <a:r>
+                        <a:rPr lang="en-US" dirty="0">
+                          <a:latin typeface="Times" pitchFamily="2" charset="0"/>
+                        </a:rPr>
+                        <a:t>65.41%</a:t>
+                      </a:r>
                     </a:p>
                   </a:txBody>
                   <a:tcPr/>
@@ -31594,9 +30930,12 @@
                     <a:lstStyle/>
                     <a:p>
                       <a:pPr algn="ctr"/>
-                      <a:endParaRPr lang="en-US" dirty="0">
-                        <a:latin typeface="Times" pitchFamily="2" charset="0"/>
-                      </a:endParaRPr>
+                      <a:r>
+                        <a:rPr lang="en-US" dirty="0">
+                          <a:latin typeface="Times" pitchFamily="2" charset="0"/>
+                        </a:rPr>
+                        <a:t>75.63%</a:t>
+                      </a:r>
                     </a:p>
                   </a:txBody>
                   <a:tcPr/>
@@ -31607,9 +30946,12 @@
                     <a:lstStyle/>
                     <a:p>
                       <a:pPr algn="ctr"/>
-                      <a:endParaRPr lang="en-US" dirty="0">
-                        <a:latin typeface="Times" pitchFamily="2" charset="0"/>
-                      </a:endParaRPr>
+                      <a:r>
+                        <a:rPr lang="en-US" dirty="0">
+                          <a:latin typeface="Times" pitchFamily="2" charset="0"/>
+                        </a:rPr>
+                        <a:t>79.95%</a:t>
+                      </a:r>
                     </a:p>
                   </a:txBody>
                   <a:tcPr/>
@@ -31620,9 +30962,12 @@
                     <a:lstStyle/>
                     <a:p>
                       <a:pPr algn="ctr"/>
-                      <a:endParaRPr lang="en-US" dirty="0">
-                        <a:latin typeface="Times" pitchFamily="2" charset="0"/>
-                      </a:endParaRPr>
+                      <a:r>
+                        <a:rPr lang="en-US" dirty="0">
+                          <a:latin typeface="Times" pitchFamily="2" charset="0"/>
+                        </a:rPr>
+                        <a:t>82.5%</a:t>
+                      </a:r>
                     </a:p>
                   </a:txBody>
                   <a:tcPr/>
@@ -31902,9 +31247,12 @@
                     <a:lstStyle/>
                     <a:p>
                       <a:pPr algn="ctr"/>
-                      <a:endParaRPr lang="en-US" dirty="0">
-                        <a:latin typeface="Times" pitchFamily="2" charset="0"/>
-                      </a:endParaRPr>
+                      <a:r>
+                        <a:rPr lang="en-US" dirty="0">
+                          <a:latin typeface="Times" pitchFamily="2" charset="0"/>
+                        </a:rPr>
+                        <a:t>81.18%</a:t>
+                      </a:r>
                     </a:p>
                   </a:txBody>
                   <a:tcPr/>
@@ -31915,9 +31263,12 @@
                     <a:lstStyle/>
                     <a:p>
                       <a:pPr algn="ctr"/>
-                      <a:endParaRPr lang="en-US" dirty="0">
-                        <a:latin typeface="Times" pitchFamily="2" charset="0"/>
-                      </a:endParaRPr>
+                      <a:r>
+                        <a:rPr lang="en-US" dirty="0">
+                          <a:latin typeface="Times" pitchFamily="2" charset="0"/>
+                        </a:rPr>
+                        <a:t>82.81%</a:t>
+                      </a:r>
                     </a:p>
                   </a:txBody>
                   <a:tcPr/>
@@ -31928,9 +31279,12 @@
                     <a:lstStyle/>
                     <a:p>
                       <a:pPr algn="ctr"/>
-                      <a:endParaRPr lang="en-US" dirty="0">
-                        <a:latin typeface="Times" pitchFamily="2" charset="0"/>
-                      </a:endParaRPr>
+                      <a:r>
+                        <a:rPr lang="en-US" dirty="0">
+                          <a:latin typeface="Times" pitchFamily="2" charset="0"/>
+                        </a:rPr>
+                        <a:t>87.11%</a:t>
+                      </a:r>
                     </a:p>
                   </a:txBody>
                   <a:tcPr/>
@@ -31941,9 +31295,12 @@
                     <a:lstStyle/>
                     <a:p>
                       <a:pPr algn="ctr"/>
-                      <a:endParaRPr lang="en-US" dirty="0">
-                        <a:latin typeface="Times" pitchFamily="2" charset="0"/>
-                      </a:endParaRPr>
+                      <a:r>
+                        <a:rPr lang="en-US" dirty="0">
+                          <a:latin typeface="Times" pitchFamily="2" charset="0"/>
+                        </a:rPr>
+                        <a:t>84.57%</a:t>
+                      </a:r>
                     </a:p>
                   </a:txBody>
                   <a:tcPr/>
@@ -31951,255 +31308,6 @@
                 <a:extLst>
                   <a:ext uri="{0D108BD9-81ED-4DB2-BD59-A6C34878D82A}">
                     <a16:rowId xmlns:a16="http://schemas.microsoft.com/office/drawing/2014/main" val="2521364167"/>
-                  </a:ext>
-                </a:extLst>
-              </a:tr>
-              <a:tr h="391668">
-                <a:tc rowSpan="2">
-                  <a:txBody>
-                    <a:bodyPr/>
-                    <a:lstStyle/>
-                    <a:p>
-                      <a:pPr algn="ctr"/>
-                      <a:r>
-                        <a:rPr lang="en-US" dirty="0">
-                          <a:latin typeface="Times" pitchFamily="2" charset="0"/>
-                        </a:rPr>
-                        <a:t>Hudson River</a:t>
-                      </a:r>
-                    </a:p>
-                  </a:txBody>
-                  <a:tcPr anchor="ctr"/>
-                </a:tc>
-                <a:tc>
-                  <a:txBody>
-                    <a:bodyPr/>
-                    <a:lstStyle/>
-                    <a:p>
-                      <a:pPr algn="ctr"/>
-                      <a:r>
-                        <a:rPr lang="en-US" altLang="zh-CN" sz="1800" b="1" kern="1200" dirty="0">
-                          <a:solidFill>
-                            <a:schemeClr val="tx1"/>
-                          </a:solidFill>
-                          <a:latin typeface="+mn-lt"/>
-                          <a:ea typeface="+mn-ea"/>
-                          <a:cs typeface="+mn-cs"/>
-                        </a:rPr>
-                        <a:t>Whole</a:t>
-                      </a:r>
-                      <a:r>
-                        <a:rPr lang="zh-CN" altLang="en-US" sz="1800" b="1" kern="1200" dirty="0">
-                          <a:solidFill>
-                            <a:schemeClr val="tx1"/>
-                          </a:solidFill>
-                          <a:latin typeface="+mn-lt"/>
-                          <a:ea typeface="+mn-ea"/>
-                          <a:cs typeface="+mn-cs"/>
-                        </a:rPr>
-                        <a:t> </a:t>
-                      </a:r>
-                      <a:r>
-                        <a:rPr lang="en-US" altLang="zh-CN" sz="1800" b="1" kern="1200" dirty="0">
-                          <a:solidFill>
-                            <a:schemeClr val="tx1"/>
-                          </a:solidFill>
-                          <a:latin typeface="+mn-lt"/>
-                          <a:ea typeface="+mn-ea"/>
-                          <a:cs typeface="+mn-cs"/>
-                        </a:rPr>
-                        <a:t>area</a:t>
-                      </a:r>
-                      <a:endParaRPr lang="en-US" dirty="0">
-                        <a:latin typeface="Times" pitchFamily="2" charset="0"/>
-                      </a:endParaRPr>
-                    </a:p>
-                  </a:txBody>
-                  <a:tcPr/>
-                </a:tc>
-                <a:tc>
-                  <a:txBody>
-                    <a:bodyPr/>
-                    <a:lstStyle/>
-                    <a:p>
-                      <a:pPr algn="ctr"/>
-                      <a:endParaRPr lang="en-US" dirty="0">
-                        <a:latin typeface="Times" pitchFamily="2" charset="0"/>
-                      </a:endParaRPr>
-                    </a:p>
-                  </a:txBody>
-                  <a:tcPr/>
-                </a:tc>
-                <a:tc>
-                  <a:txBody>
-                    <a:bodyPr/>
-                    <a:lstStyle/>
-                    <a:p>
-                      <a:pPr algn="ctr"/>
-                      <a:endParaRPr lang="en-US" dirty="0">
-                        <a:latin typeface="Times" pitchFamily="2" charset="0"/>
-                      </a:endParaRPr>
-                    </a:p>
-                  </a:txBody>
-                  <a:tcPr/>
-                </a:tc>
-                <a:tc>
-                  <a:txBody>
-                    <a:bodyPr/>
-                    <a:lstStyle/>
-                    <a:p>
-                      <a:pPr algn="ctr"/>
-                      <a:endParaRPr lang="en-US" dirty="0">
-                        <a:latin typeface="Times" pitchFamily="2" charset="0"/>
-                      </a:endParaRPr>
-                    </a:p>
-                  </a:txBody>
-                  <a:tcPr/>
-                </a:tc>
-                <a:tc>
-                  <a:txBody>
-                    <a:bodyPr/>
-                    <a:lstStyle/>
-                    <a:p>
-                      <a:pPr algn="ctr"/>
-                      <a:endParaRPr lang="en-US" dirty="0">
-                        <a:latin typeface="Times" pitchFamily="2" charset="0"/>
-                      </a:endParaRPr>
-                    </a:p>
-                  </a:txBody>
-                  <a:tcPr/>
-                </a:tc>
-                <a:extLst>
-                  <a:ext uri="{0D108BD9-81ED-4DB2-BD59-A6C34878D82A}">
-                    <a16:rowId xmlns:a16="http://schemas.microsoft.com/office/drawing/2014/main" val="3296006206"/>
-                  </a:ext>
-                </a:extLst>
-              </a:tr>
-              <a:tr h="391668">
-                <a:tc vMerge="1">
-                  <a:txBody>
-                    <a:bodyPr/>
-                    <a:lstStyle/>
-                    <a:p>
-                      <a:pPr algn="ctr"/>
-                      <a:endParaRPr lang="en-US" dirty="0">
-                        <a:latin typeface="Times" pitchFamily="2" charset="0"/>
-                      </a:endParaRPr>
-                    </a:p>
-                  </a:txBody>
-                  <a:tcPr anchor="ctr"/>
-                </a:tc>
-                <a:tc>
-                  <a:txBody>
-                    <a:bodyPr/>
-                    <a:lstStyle/>
-                    <a:p>
-                      <a:pPr marL="0" marR="0" lvl="0" indent="0" algn="ctr" defTabSz="914400" rtl="0" eaLnBrk="1" fontAlgn="auto" latinLnBrk="0" hangingPunct="1">
-                        <a:lnSpc>
-                          <a:spcPct val="100000"/>
-                        </a:lnSpc>
-                        <a:spcBef>
-                          <a:spcPts val="0"/>
-                        </a:spcBef>
-                        <a:spcAft>
-                          <a:spcPts val="0"/>
-                        </a:spcAft>
-                        <a:buClrTx/>
-                        <a:buSzTx/>
-                        <a:buFontTx/>
-                        <a:buNone/>
-                        <a:tabLst/>
-                        <a:defRPr/>
-                      </a:pPr>
-                      <a:r>
-                        <a:rPr lang="zh-CN" altLang="en-US" sz="1800" b="1" kern="1200" dirty="0">
-                          <a:solidFill>
-                            <a:schemeClr val="tx1"/>
-                          </a:solidFill>
-                          <a:latin typeface="+mn-lt"/>
-                          <a:ea typeface="+mn-ea"/>
-                          <a:cs typeface="+mn-cs"/>
-                        </a:rPr>
-                        <a:t> </a:t>
-                      </a:r>
-                      <a:r>
-                        <a:rPr lang="en-US" altLang="zh-CN" sz="1800" b="1" kern="1200" dirty="0">
-                          <a:solidFill>
-                            <a:schemeClr val="tx1"/>
-                          </a:solidFill>
-                          <a:latin typeface="+mn-lt"/>
-                          <a:ea typeface="+mn-ea"/>
-                          <a:cs typeface="+mn-cs"/>
-                        </a:rPr>
-                        <a:t>test routes</a:t>
-                      </a:r>
-                      <a:endParaRPr lang="en-US" sz="1800" b="1" kern="1200" dirty="0">
-                        <a:solidFill>
-                          <a:schemeClr val="tx1"/>
-                        </a:solidFill>
-                        <a:latin typeface="+mn-lt"/>
-                        <a:ea typeface="+mn-ea"/>
-                        <a:cs typeface="+mn-cs"/>
-                      </a:endParaRPr>
-                    </a:p>
-                  </a:txBody>
-                  <a:tcPr/>
-                </a:tc>
-                <a:tc>
-                  <a:txBody>
-                    <a:bodyPr/>
-                    <a:lstStyle/>
-                    <a:p>
-                      <a:pPr algn="ctr"/>
-                      <a:endParaRPr lang="en-US" dirty="0">
-                        <a:latin typeface="Times" pitchFamily="2" charset="0"/>
-                      </a:endParaRPr>
-                    </a:p>
-                  </a:txBody>
-                  <a:tcPr/>
-                </a:tc>
-                <a:tc>
-                  <a:txBody>
-                    <a:bodyPr/>
-                    <a:lstStyle/>
-                    <a:p>
-                      <a:pPr algn="ctr"/>
-                      <a:endParaRPr lang="en-US" dirty="0">
-                        <a:latin typeface="Times" pitchFamily="2" charset="0"/>
-                      </a:endParaRPr>
-                    </a:p>
-                  </a:txBody>
-                  <a:tcPr/>
-                </a:tc>
-                <a:tc>
-                  <a:txBody>
-                    <a:bodyPr/>
-                    <a:lstStyle/>
-                    <a:p>
-                      <a:pPr algn="ctr"/>
-                      <a:endParaRPr lang="en-US" dirty="0">
-                        <a:latin typeface="Times" pitchFamily="2" charset="0"/>
-                      </a:endParaRPr>
-                    </a:p>
-                  </a:txBody>
-                  <a:tcPr/>
-                </a:tc>
-                <a:tc>
-                  <a:txBody>
-                    <a:bodyPr/>
-                    <a:lstStyle/>
-                    <a:p>
-                      <a:pPr algn="ctr"/>
-                      <a:endParaRPr lang="en-US" dirty="0">
-                        <a:latin typeface="Times" pitchFamily="2" charset="0"/>
-                      </a:endParaRPr>
-                    </a:p>
-                  </a:txBody>
-                  <a:tcPr/>
-                </a:tc>
-                <a:extLst>
-                  <a:ext uri="{0D108BD9-81ED-4DB2-BD59-A6C34878D82A}">
-                    <a16:rowId xmlns:a16="http://schemas.microsoft.com/office/drawing/2014/main" val="188873265"/>
                   </a:ext>
                 </a:extLst>
               </a:tr>
@@ -35174,6 +34282,766 @@
 </p:sld>
 </file>
 
+<file path=ppt/slides/slide66.xml><?xml version="1.0" encoding="utf-8"?>
+<p:sld xmlns:a="http://schemas.openxmlformats.org/drawingml/2006/main" xmlns:r="http://schemas.openxmlformats.org/officeDocument/2006/relationships" xmlns:p="http://schemas.openxmlformats.org/presentationml/2006/main">
+  <p:cSld>
+    <p:spTree>
+      <p:nvGrpSpPr>
+        <p:cNvPr id="1" name=""/>
+        <p:cNvGrpSpPr/>
+        <p:nvPr/>
+      </p:nvGrpSpPr>
+      <p:grpSpPr>
+        <a:xfrm>
+          <a:off x="0" y="0"/>
+          <a:ext cx="0" cy="0"/>
+          <a:chOff x="0" y="0"/>
+          <a:chExt cx="0" cy="0"/>
+        </a:xfrm>
+      </p:grpSpPr>
+      <p:sp>
+        <p:nvSpPr>
+          <p:cNvPr id="2" name="Title 1">
+            <a:extLst>
+              <a:ext uri="{FF2B5EF4-FFF2-40B4-BE49-F238E27FC236}">
+                <a16:creationId xmlns:a16="http://schemas.microsoft.com/office/drawing/2014/main" id="{56532D06-E3DD-8743-A24B-5D0E4F6AA76A}"/>
+              </a:ext>
+            </a:extLst>
+          </p:cNvPr>
+          <p:cNvSpPr>
+            <a:spLocks noGrp="1"/>
+          </p:cNvSpPr>
+          <p:nvPr>
+            <p:ph type="title"/>
+          </p:nvPr>
+        </p:nvSpPr>
+        <p:spPr>
+          <a:xfrm>
+            <a:off x="943131" y="2718581"/>
+            <a:ext cx="10515600" cy="1325563"/>
+          </a:xfrm>
+        </p:spPr>
+        <p:txBody>
+          <a:bodyPr/>
+          <a:lstStyle/>
+          <a:p>
+            <a:pPr algn="ctr"/>
+            <a:r>
+              <a:rPr lang="en-US" dirty="0"/>
+              <a:t>BSD Distribution for Different Versions</a:t>
+            </a:r>
+          </a:p>
+        </p:txBody>
+      </p:sp>
+    </p:spTree>
+    <p:extLst>
+      <p:ext uri="{BB962C8B-B14F-4D97-AF65-F5344CB8AC3E}">
+        <p14:creationId xmlns:p14="http://schemas.microsoft.com/office/powerpoint/2010/main" val="2746652001"/>
+      </p:ext>
+    </p:extLst>
+  </p:cSld>
+  <p:clrMapOvr>
+    <a:masterClrMapping/>
+  </p:clrMapOvr>
+</p:sld>
+</file>
+
+<file path=ppt/slides/slide67.xml><?xml version="1.0" encoding="utf-8"?>
+<p:sld xmlns:a="http://schemas.openxmlformats.org/drawingml/2006/main" xmlns:r="http://schemas.openxmlformats.org/officeDocument/2006/relationships" xmlns:p="http://schemas.openxmlformats.org/presentationml/2006/main">
+  <p:cSld>
+    <p:spTree>
+      <p:nvGrpSpPr>
+        <p:cNvPr id="1" name=""/>
+        <p:cNvGrpSpPr/>
+        <p:nvPr/>
+      </p:nvGrpSpPr>
+      <p:grpSpPr>
+        <a:xfrm>
+          <a:off x="0" y="0"/>
+          <a:ext cx="0" cy="0"/>
+          <a:chOff x="0" y="0"/>
+          <a:chExt cx="0" cy="0"/>
+        </a:xfrm>
+      </p:grpSpPr>
+      <p:sp>
+        <p:nvSpPr>
+          <p:cNvPr id="2" name="Title 1">
+            <a:extLst>
+              <a:ext uri="{FF2B5EF4-FFF2-40B4-BE49-F238E27FC236}">
+                <a16:creationId xmlns:a16="http://schemas.microsoft.com/office/drawing/2014/main" id="{46361B42-B30E-5547-87CF-A131C3AE3000}"/>
+              </a:ext>
+            </a:extLst>
+          </p:cNvPr>
+          <p:cNvSpPr>
+            <a:spLocks noGrp="1"/>
+          </p:cNvSpPr>
+          <p:nvPr>
+            <p:ph type="title"/>
+          </p:nvPr>
+        </p:nvSpPr>
+        <p:spPr/>
+        <p:txBody>
+          <a:bodyPr/>
+          <a:lstStyle/>
+          <a:p>
+            <a:pPr algn="ctr"/>
+            <a:r>
+              <a:rPr lang="en-US" dirty="0"/>
+              <a:t>Wall Street</a:t>
+            </a:r>
+          </a:p>
+        </p:txBody>
+      </p:sp>
+      <p:pic>
+        <p:nvPicPr>
+          <p:cNvPr id="5" name="Content Placeholder 4">
+            <a:extLst>
+              <a:ext uri="{FF2B5EF4-FFF2-40B4-BE49-F238E27FC236}">
+                <a16:creationId xmlns:a16="http://schemas.microsoft.com/office/drawing/2014/main" id="{2C4DECBD-2DB9-9C4E-B589-8151EB61B19B}"/>
+              </a:ext>
+            </a:extLst>
+          </p:cNvPr>
+          <p:cNvPicPr>
+            <a:picLocks noGrp="1" noChangeAspect="1"/>
+          </p:cNvPicPr>
+          <p:nvPr>
+            <p:ph idx="1"/>
+          </p:nvPr>
+        </p:nvPicPr>
+        <p:blipFill>
+          <a:blip r:embed="rId2"/>
+          <a:stretch>
+            <a:fillRect/>
+          </a:stretch>
+        </p:blipFill>
+        <p:spPr>
+          <a:xfrm>
+            <a:off x="-47712" y="1785439"/>
+            <a:ext cx="4441321" cy="3330991"/>
+          </a:xfrm>
+        </p:spPr>
+      </p:pic>
+      <p:sp>
+        <p:nvSpPr>
+          <p:cNvPr id="6" name="TextBox 5">
+            <a:extLst>
+              <a:ext uri="{FF2B5EF4-FFF2-40B4-BE49-F238E27FC236}">
+                <a16:creationId xmlns:a16="http://schemas.microsoft.com/office/drawing/2014/main" id="{86DE449D-430A-BE49-A2D6-A529F4DACE20}"/>
+              </a:ext>
+            </a:extLst>
+          </p:cNvPr>
+          <p:cNvSpPr txBox="1"/>
+          <p:nvPr/>
+        </p:nvSpPr>
+        <p:spPr>
+          <a:xfrm>
+            <a:off x="838200" y="4931764"/>
+            <a:ext cx="2669498" cy="369332"/>
+          </a:xfrm>
+          <a:prstGeom prst="rect">
+            <a:avLst/>
+          </a:prstGeom>
+          <a:noFill/>
+        </p:spPr>
+        <p:txBody>
+          <a:bodyPr wrap="square" rtlCol="0">
+            <a:spAutoFit/>
+          </a:bodyPr>
+          <a:lstStyle/>
+          <a:p>
+            <a:pPr algn="ctr"/>
+            <a:r>
+              <a:rPr lang="en-US" dirty="0"/>
+              <a:t>real</a:t>
+            </a:r>
+          </a:p>
+        </p:txBody>
+      </p:sp>
+      <p:pic>
+        <p:nvPicPr>
+          <p:cNvPr id="7" name="Content Placeholder 4">
+            <a:extLst>
+              <a:ext uri="{FF2B5EF4-FFF2-40B4-BE49-F238E27FC236}">
+                <a16:creationId xmlns:a16="http://schemas.microsoft.com/office/drawing/2014/main" id="{1154419F-3A40-6043-BF88-C0BE16F62E8A}"/>
+              </a:ext>
+            </a:extLst>
+          </p:cNvPr>
+          <p:cNvPicPr>
+            <a:picLocks noChangeAspect="1"/>
+          </p:cNvPicPr>
+          <p:nvPr/>
+        </p:nvPicPr>
+        <p:blipFill>
+          <a:blip r:embed="rId3"/>
+          <a:stretch>
+            <a:fillRect/>
+          </a:stretch>
+        </p:blipFill>
+        <p:spPr>
+          <a:xfrm>
+            <a:off x="3982908" y="1785439"/>
+            <a:ext cx="4441321" cy="3330990"/>
+          </a:xfrm>
+          <a:prstGeom prst="rect">
+            <a:avLst/>
+          </a:prstGeom>
+        </p:spPr>
+      </p:pic>
+      <p:pic>
+        <p:nvPicPr>
+          <p:cNvPr id="8" name="Content Placeholder 4">
+            <a:extLst>
+              <a:ext uri="{FF2B5EF4-FFF2-40B4-BE49-F238E27FC236}">
+                <a16:creationId xmlns:a16="http://schemas.microsoft.com/office/drawing/2014/main" id="{6ECE6086-B60B-3B40-9A32-F6023F97ACF6}"/>
+              </a:ext>
+            </a:extLst>
+          </p:cNvPr>
+          <p:cNvPicPr>
+            <a:picLocks noChangeAspect="1"/>
+          </p:cNvPicPr>
+          <p:nvPr/>
+        </p:nvPicPr>
+        <p:blipFill>
+          <a:blip r:embed="rId4"/>
+          <a:stretch>
+            <a:fillRect/>
+          </a:stretch>
+        </p:blipFill>
+        <p:spPr>
+          <a:xfrm>
+            <a:off x="8013528" y="1785439"/>
+            <a:ext cx="4441321" cy="3330990"/>
+          </a:xfrm>
+          <a:prstGeom prst="rect">
+            <a:avLst/>
+          </a:prstGeom>
+        </p:spPr>
+      </p:pic>
+      <p:sp>
+        <p:nvSpPr>
+          <p:cNvPr id="9" name="TextBox 8">
+            <a:extLst>
+              <a:ext uri="{FF2B5EF4-FFF2-40B4-BE49-F238E27FC236}">
+                <a16:creationId xmlns:a16="http://schemas.microsoft.com/office/drawing/2014/main" id="{980FAE4A-0ACB-BD49-820D-6CCA6583E1E8}"/>
+              </a:ext>
+            </a:extLst>
+          </p:cNvPr>
+          <p:cNvSpPr txBox="1"/>
+          <p:nvPr/>
+        </p:nvSpPr>
+        <p:spPr>
+          <a:xfrm>
+            <a:off x="5074170" y="5026515"/>
+            <a:ext cx="2669498" cy="369332"/>
+          </a:xfrm>
+          <a:prstGeom prst="rect">
+            <a:avLst/>
+          </a:prstGeom>
+          <a:noFill/>
+        </p:spPr>
+        <p:txBody>
+          <a:bodyPr wrap="square" rtlCol="0">
+            <a:spAutoFit/>
+          </a:bodyPr>
+          <a:lstStyle/>
+          <a:p>
+            <a:pPr algn="ctr"/>
+            <a:r>
+              <a:rPr lang="en-US" dirty="0"/>
+              <a:t>v2</a:t>
+            </a:r>
+          </a:p>
+        </p:txBody>
+      </p:sp>
+      <p:sp>
+        <p:nvSpPr>
+          <p:cNvPr id="10" name="TextBox 9">
+            <a:extLst>
+              <a:ext uri="{FF2B5EF4-FFF2-40B4-BE49-F238E27FC236}">
+                <a16:creationId xmlns:a16="http://schemas.microsoft.com/office/drawing/2014/main" id="{1FDE36BB-8719-3B4E-9FA3-F4B4468B3EE0}"/>
+              </a:ext>
+            </a:extLst>
+          </p:cNvPr>
+          <p:cNvSpPr txBox="1"/>
+          <p:nvPr/>
+        </p:nvSpPr>
+        <p:spPr>
+          <a:xfrm>
+            <a:off x="9104790" y="4931764"/>
+            <a:ext cx="2669498" cy="369332"/>
+          </a:xfrm>
+          <a:prstGeom prst="rect">
+            <a:avLst/>
+          </a:prstGeom>
+          <a:noFill/>
+        </p:spPr>
+        <p:txBody>
+          <a:bodyPr wrap="square" rtlCol="0">
+            <a:spAutoFit/>
+          </a:bodyPr>
+          <a:lstStyle/>
+          <a:p>
+            <a:pPr algn="ctr"/>
+            <a:r>
+              <a:rPr lang="en-US" dirty="0"/>
+              <a:t>v3</a:t>
+            </a:r>
+          </a:p>
+        </p:txBody>
+      </p:sp>
+    </p:spTree>
+    <p:extLst>
+      <p:ext uri="{BB962C8B-B14F-4D97-AF65-F5344CB8AC3E}">
+        <p14:creationId xmlns:p14="http://schemas.microsoft.com/office/powerpoint/2010/main" val="2117324583"/>
+      </p:ext>
+    </p:extLst>
+  </p:cSld>
+  <p:clrMapOvr>
+    <a:masterClrMapping/>
+  </p:clrMapOvr>
+</p:sld>
+</file>
+
+<file path=ppt/slides/slide68.xml><?xml version="1.0" encoding="utf-8"?>
+<p:sld xmlns:a="http://schemas.openxmlformats.org/drawingml/2006/main" xmlns:r="http://schemas.openxmlformats.org/officeDocument/2006/relationships" xmlns:p="http://schemas.openxmlformats.org/presentationml/2006/main">
+  <p:cSld>
+    <p:spTree>
+      <p:nvGrpSpPr>
+        <p:cNvPr id="1" name=""/>
+        <p:cNvGrpSpPr/>
+        <p:nvPr/>
+      </p:nvGrpSpPr>
+      <p:grpSpPr>
+        <a:xfrm>
+          <a:off x="0" y="0"/>
+          <a:ext cx="0" cy="0"/>
+          <a:chOff x="0" y="0"/>
+          <a:chExt cx="0" cy="0"/>
+        </a:xfrm>
+      </p:grpSpPr>
+      <p:sp>
+        <p:nvSpPr>
+          <p:cNvPr id="2" name="Title 1">
+            <a:extLst>
+              <a:ext uri="{FF2B5EF4-FFF2-40B4-BE49-F238E27FC236}">
+                <a16:creationId xmlns:a16="http://schemas.microsoft.com/office/drawing/2014/main" id="{46361B42-B30E-5547-87CF-A131C3AE3000}"/>
+              </a:ext>
+            </a:extLst>
+          </p:cNvPr>
+          <p:cNvSpPr>
+            <a:spLocks noGrp="1"/>
+          </p:cNvSpPr>
+          <p:nvPr>
+            <p:ph type="title"/>
+          </p:nvPr>
+        </p:nvSpPr>
+        <p:spPr/>
+        <p:txBody>
+          <a:bodyPr/>
+          <a:lstStyle/>
+          <a:p>
+            <a:pPr algn="ctr"/>
+            <a:r>
+              <a:rPr lang="en-US" dirty="0"/>
+              <a:t>Union Square</a:t>
+            </a:r>
+          </a:p>
+        </p:txBody>
+      </p:sp>
+      <p:pic>
+        <p:nvPicPr>
+          <p:cNvPr id="5" name="Content Placeholder 4">
+            <a:extLst>
+              <a:ext uri="{FF2B5EF4-FFF2-40B4-BE49-F238E27FC236}">
+                <a16:creationId xmlns:a16="http://schemas.microsoft.com/office/drawing/2014/main" id="{2C4DECBD-2DB9-9C4E-B589-8151EB61B19B}"/>
+              </a:ext>
+            </a:extLst>
+          </p:cNvPr>
+          <p:cNvPicPr>
+            <a:picLocks noGrp="1" noChangeAspect="1"/>
+          </p:cNvPicPr>
+          <p:nvPr>
+            <p:ph idx="1"/>
+          </p:nvPr>
+        </p:nvPicPr>
+        <p:blipFill>
+          <a:blip r:embed="rId2"/>
+          <a:stretch>
+            <a:fillRect/>
+          </a:stretch>
+        </p:blipFill>
+        <p:spPr>
+          <a:xfrm>
+            <a:off x="-47712" y="1785439"/>
+            <a:ext cx="4441321" cy="3330990"/>
+          </a:xfrm>
+        </p:spPr>
+      </p:pic>
+      <p:sp>
+        <p:nvSpPr>
+          <p:cNvPr id="6" name="TextBox 5">
+            <a:extLst>
+              <a:ext uri="{FF2B5EF4-FFF2-40B4-BE49-F238E27FC236}">
+                <a16:creationId xmlns:a16="http://schemas.microsoft.com/office/drawing/2014/main" id="{86DE449D-430A-BE49-A2D6-A529F4DACE20}"/>
+              </a:ext>
+            </a:extLst>
+          </p:cNvPr>
+          <p:cNvSpPr txBox="1"/>
+          <p:nvPr/>
+        </p:nvSpPr>
+        <p:spPr>
+          <a:xfrm>
+            <a:off x="838200" y="4931764"/>
+            <a:ext cx="2669498" cy="369332"/>
+          </a:xfrm>
+          <a:prstGeom prst="rect">
+            <a:avLst/>
+          </a:prstGeom>
+          <a:noFill/>
+        </p:spPr>
+        <p:txBody>
+          <a:bodyPr wrap="square" rtlCol="0">
+            <a:spAutoFit/>
+          </a:bodyPr>
+          <a:lstStyle/>
+          <a:p>
+            <a:pPr algn="ctr"/>
+            <a:r>
+              <a:rPr lang="en-US" dirty="0"/>
+              <a:t>real</a:t>
+            </a:r>
+          </a:p>
+        </p:txBody>
+      </p:sp>
+      <p:pic>
+        <p:nvPicPr>
+          <p:cNvPr id="7" name="Content Placeholder 4">
+            <a:extLst>
+              <a:ext uri="{FF2B5EF4-FFF2-40B4-BE49-F238E27FC236}">
+                <a16:creationId xmlns:a16="http://schemas.microsoft.com/office/drawing/2014/main" id="{1154419F-3A40-6043-BF88-C0BE16F62E8A}"/>
+              </a:ext>
+            </a:extLst>
+          </p:cNvPr>
+          <p:cNvPicPr>
+            <a:picLocks noChangeAspect="1"/>
+          </p:cNvPicPr>
+          <p:nvPr/>
+        </p:nvPicPr>
+        <p:blipFill>
+          <a:blip r:embed="rId3"/>
+          <a:stretch>
+            <a:fillRect/>
+          </a:stretch>
+        </p:blipFill>
+        <p:spPr>
+          <a:xfrm>
+            <a:off x="3982908" y="1785439"/>
+            <a:ext cx="4441320" cy="3330990"/>
+          </a:xfrm>
+          <a:prstGeom prst="rect">
+            <a:avLst/>
+          </a:prstGeom>
+        </p:spPr>
+      </p:pic>
+      <p:pic>
+        <p:nvPicPr>
+          <p:cNvPr id="8" name="Content Placeholder 4">
+            <a:extLst>
+              <a:ext uri="{FF2B5EF4-FFF2-40B4-BE49-F238E27FC236}">
+                <a16:creationId xmlns:a16="http://schemas.microsoft.com/office/drawing/2014/main" id="{6ECE6086-B60B-3B40-9A32-F6023F97ACF6}"/>
+              </a:ext>
+            </a:extLst>
+          </p:cNvPr>
+          <p:cNvPicPr>
+            <a:picLocks noChangeAspect="1"/>
+          </p:cNvPicPr>
+          <p:nvPr/>
+        </p:nvPicPr>
+        <p:blipFill>
+          <a:blip r:embed="rId4"/>
+          <a:stretch>
+            <a:fillRect/>
+          </a:stretch>
+        </p:blipFill>
+        <p:spPr>
+          <a:xfrm>
+            <a:off x="8013528" y="1785439"/>
+            <a:ext cx="4441320" cy="3330990"/>
+          </a:xfrm>
+          <a:prstGeom prst="rect">
+            <a:avLst/>
+          </a:prstGeom>
+        </p:spPr>
+      </p:pic>
+      <p:sp>
+        <p:nvSpPr>
+          <p:cNvPr id="9" name="TextBox 8">
+            <a:extLst>
+              <a:ext uri="{FF2B5EF4-FFF2-40B4-BE49-F238E27FC236}">
+                <a16:creationId xmlns:a16="http://schemas.microsoft.com/office/drawing/2014/main" id="{980FAE4A-0ACB-BD49-820D-6CCA6583E1E8}"/>
+              </a:ext>
+            </a:extLst>
+          </p:cNvPr>
+          <p:cNvSpPr txBox="1"/>
+          <p:nvPr/>
+        </p:nvSpPr>
+        <p:spPr>
+          <a:xfrm>
+            <a:off x="5074170" y="5026515"/>
+            <a:ext cx="2669498" cy="369332"/>
+          </a:xfrm>
+          <a:prstGeom prst="rect">
+            <a:avLst/>
+          </a:prstGeom>
+          <a:noFill/>
+        </p:spPr>
+        <p:txBody>
+          <a:bodyPr wrap="square" rtlCol="0">
+            <a:spAutoFit/>
+          </a:bodyPr>
+          <a:lstStyle/>
+          <a:p>
+            <a:pPr algn="ctr"/>
+            <a:r>
+              <a:rPr lang="en-US" dirty="0"/>
+              <a:t>v2</a:t>
+            </a:r>
+          </a:p>
+        </p:txBody>
+      </p:sp>
+      <p:sp>
+        <p:nvSpPr>
+          <p:cNvPr id="10" name="TextBox 9">
+            <a:extLst>
+              <a:ext uri="{FF2B5EF4-FFF2-40B4-BE49-F238E27FC236}">
+                <a16:creationId xmlns:a16="http://schemas.microsoft.com/office/drawing/2014/main" id="{1FDE36BB-8719-3B4E-9FA3-F4B4468B3EE0}"/>
+              </a:ext>
+            </a:extLst>
+          </p:cNvPr>
+          <p:cNvSpPr txBox="1"/>
+          <p:nvPr/>
+        </p:nvSpPr>
+        <p:spPr>
+          <a:xfrm>
+            <a:off x="9104790" y="4931764"/>
+            <a:ext cx="2669498" cy="369332"/>
+          </a:xfrm>
+          <a:prstGeom prst="rect">
+            <a:avLst/>
+          </a:prstGeom>
+          <a:noFill/>
+        </p:spPr>
+        <p:txBody>
+          <a:bodyPr wrap="square" rtlCol="0">
+            <a:spAutoFit/>
+          </a:bodyPr>
+          <a:lstStyle/>
+          <a:p>
+            <a:pPr algn="ctr"/>
+            <a:r>
+              <a:rPr lang="en-US" dirty="0"/>
+              <a:t>v3</a:t>
+            </a:r>
+          </a:p>
+        </p:txBody>
+      </p:sp>
+    </p:spTree>
+    <p:extLst>
+      <p:ext uri="{BB962C8B-B14F-4D97-AF65-F5344CB8AC3E}">
+        <p14:creationId xmlns:p14="http://schemas.microsoft.com/office/powerpoint/2010/main" val="3006717380"/>
+      </p:ext>
+    </p:extLst>
+  </p:cSld>
+  <p:clrMapOvr>
+    <a:masterClrMapping/>
+  </p:clrMapOvr>
+</p:sld>
+</file>
+
+<file path=ppt/slides/slide69.xml><?xml version="1.0" encoding="utf-8"?>
+<p:sld xmlns:a="http://schemas.openxmlformats.org/drawingml/2006/main" xmlns:r="http://schemas.openxmlformats.org/officeDocument/2006/relationships" xmlns:p="http://schemas.openxmlformats.org/presentationml/2006/main">
+  <p:cSld>
+    <p:spTree>
+      <p:nvGrpSpPr>
+        <p:cNvPr id="1" name=""/>
+        <p:cNvGrpSpPr/>
+        <p:nvPr/>
+      </p:nvGrpSpPr>
+      <p:grpSpPr>
+        <a:xfrm>
+          <a:off x="0" y="0"/>
+          <a:ext cx="0" cy="0"/>
+          <a:chOff x="0" y="0"/>
+          <a:chExt cx="0" cy="0"/>
+        </a:xfrm>
+      </p:grpSpPr>
+      <p:sp>
+        <p:nvSpPr>
+          <p:cNvPr id="2" name="Title 1">
+            <a:extLst>
+              <a:ext uri="{FF2B5EF4-FFF2-40B4-BE49-F238E27FC236}">
+                <a16:creationId xmlns:a16="http://schemas.microsoft.com/office/drawing/2014/main" id="{217D2C37-9B7A-014A-B3E8-F216E2C37357}"/>
+              </a:ext>
+            </a:extLst>
+          </p:cNvPr>
+          <p:cNvSpPr>
+            <a:spLocks noGrp="1"/>
+          </p:cNvSpPr>
+          <p:nvPr>
+            <p:ph type="title"/>
+          </p:nvPr>
+        </p:nvSpPr>
+        <p:spPr>
+          <a:xfrm>
+            <a:off x="1063052" y="200233"/>
+            <a:ext cx="10515600" cy="1325563"/>
+          </a:xfrm>
+        </p:spPr>
+        <p:txBody>
+          <a:bodyPr/>
+          <a:lstStyle/>
+          <a:p>
+            <a:pPr algn="ctr"/>
+            <a:r>
+              <a:rPr lang="en-US" dirty="0"/>
+              <a:t>Some Errors</a:t>
+            </a:r>
+          </a:p>
+        </p:txBody>
+      </p:sp>
+      <p:pic>
+        <p:nvPicPr>
+          <p:cNvPr id="5" name="Picture 4">
+            <a:extLst>
+              <a:ext uri="{FF2B5EF4-FFF2-40B4-BE49-F238E27FC236}">
+                <a16:creationId xmlns:a16="http://schemas.microsoft.com/office/drawing/2014/main" id="{84C0D742-BE19-3448-AD55-2C60DEA0527B}"/>
+              </a:ext>
+            </a:extLst>
+          </p:cNvPr>
+          <p:cNvPicPr>
+            <a:picLocks noChangeAspect="1"/>
+          </p:cNvPicPr>
+          <p:nvPr/>
+        </p:nvPicPr>
+        <p:blipFill>
+          <a:blip r:embed="rId2"/>
+          <a:stretch>
+            <a:fillRect/>
+          </a:stretch>
+        </p:blipFill>
+        <p:spPr>
+          <a:xfrm>
+            <a:off x="3055078" y="1178290"/>
+            <a:ext cx="3540593" cy="2655445"/>
+          </a:xfrm>
+          <a:prstGeom prst="rect">
+            <a:avLst/>
+          </a:prstGeom>
+        </p:spPr>
+      </p:pic>
+      <p:pic>
+        <p:nvPicPr>
+          <p:cNvPr id="7" name="Picture 6">
+            <a:extLst>
+              <a:ext uri="{FF2B5EF4-FFF2-40B4-BE49-F238E27FC236}">
+                <a16:creationId xmlns:a16="http://schemas.microsoft.com/office/drawing/2014/main" id="{D2406A33-826E-264B-9CF5-C5A41F026988}"/>
+              </a:ext>
+            </a:extLst>
+          </p:cNvPr>
+          <p:cNvPicPr>
+            <a:picLocks noChangeAspect="1"/>
+          </p:cNvPicPr>
+          <p:nvPr/>
+        </p:nvPicPr>
+        <p:blipFill>
+          <a:blip r:embed="rId3"/>
+          <a:stretch>
+            <a:fillRect/>
+          </a:stretch>
+        </p:blipFill>
+        <p:spPr>
+          <a:xfrm>
+            <a:off x="5952759" y="1181724"/>
+            <a:ext cx="3536014" cy="2652011"/>
+          </a:xfrm>
+          <a:prstGeom prst="rect">
+            <a:avLst/>
+          </a:prstGeom>
+        </p:spPr>
+      </p:pic>
+      <p:pic>
+        <p:nvPicPr>
+          <p:cNvPr id="9" name="Picture 8">
+            <a:extLst>
+              <a:ext uri="{FF2B5EF4-FFF2-40B4-BE49-F238E27FC236}">
+                <a16:creationId xmlns:a16="http://schemas.microsoft.com/office/drawing/2014/main" id="{81D0947A-7D8E-1B47-90D9-F18E29EB1283}"/>
+              </a:ext>
+            </a:extLst>
+          </p:cNvPr>
+          <p:cNvPicPr>
+            <a:picLocks noChangeAspect="1"/>
+          </p:cNvPicPr>
+          <p:nvPr/>
+        </p:nvPicPr>
+        <p:blipFill>
+          <a:blip r:embed="rId4"/>
+          <a:stretch>
+            <a:fillRect/>
+          </a:stretch>
+        </p:blipFill>
+        <p:spPr>
+          <a:xfrm>
+            <a:off x="2998445" y="3833735"/>
+            <a:ext cx="3658433" cy="2743825"/>
+          </a:xfrm>
+          <a:prstGeom prst="rect">
+            <a:avLst/>
+          </a:prstGeom>
+        </p:spPr>
+      </p:pic>
+      <p:pic>
+        <p:nvPicPr>
+          <p:cNvPr id="11" name="Picture 10">
+            <a:extLst>
+              <a:ext uri="{FF2B5EF4-FFF2-40B4-BE49-F238E27FC236}">
+                <a16:creationId xmlns:a16="http://schemas.microsoft.com/office/drawing/2014/main" id="{5F33D98D-1900-514D-82D2-46678968F8C6}"/>
+              </a:ext>
+            </a:extLst>
+          </p:cNvPr>
+          <p:cNvPicPr>
+            <a:picLocks noChangeAspect="1"/>
+          </p:cNvPicPr>
+          <p:nvPr/>
+        </p:nvPicPr>
+        <p:blipFill>
+          <a:blip r:embed="rId5"/>
+          <a:stretch>
+            <a:fillRect/>
+          </a:stretch>
+        </p:blipFill>
+        <p:spPr>
+          <a:xfrm>
+            <a:off x="5937769" y="3833734"/>
+            <a:ext cx="3658434" cy="2743826"/>
+          </a:xfrm>
+          <a:prstGeom prst="rect">
+            <a:avLst/>
+          </a:prstGeom>
+        </p:spPr>
+      </p:pic>
+    </p:spTree>
+    <p:extLst>
+      <p:ext uri="{BB962C8B-B14F-4D97-AF65-F5344CB8AC3E}">
+        <p14:creationId xmlns:p14="http://schemas.microsoft.com/office/powerpoint/2010/main" val="233685936"/>
+      </p:ext>
+    </p:extLst>
+  </p:cSld>
+  <p:clrMapOvr>
+    <a:masterClrMapping/>
+  </p:clrMapOvr>
+</p:sld>
+</file>
+
 <file path=ppt/slides/slide7.xml><?xml version="1.0" encoding="utf-8"?>
 <p:sld xmlns:a="http://schemas.openxmlformats.org/drawingml/2006/main" xmlns:r="http://schemas.openxmlformats.org/officeDocument/2006/relationships" xmlns:p="http://schemas.openxmlformats.org/presentationml/2006/main">
   <p:cSld>
@@ -35363,6 +35231,355 @@
     <p:extLst>
       <p:ext uri="{BB962C8B-B14F-4D97-AF65-F5344CB8AC3E}">
         <p14:creationId xmlns:p14="http://schemas.microsoft.com/office/powerpoint/2010/main" val="271980339"/>
+      </p:ext>
+    </p:extLst>
+  </p:cSld>
+  <p:clrMapOvr>
+    <a:masterClrMapping/>
+  </p:clrMapOvr>
+</p:sld>
+</file>
+
+<file path=ppt/slides/slide70.xml><?xml version="1.0" encoding="utf-8"?>
+<p:sld xmlns:a="http://schemas.openxmlformats.org/drawingml/2006/main" xmlns:r="http://schemas.openxmlformats.org/officeDocument/2006/relationships" xmlns:p="http://schemas.openxmlformats.org/presentationml/2006/main">
+  <p:cSld>
+    <p:spTree>
+      <p:nvGrpSpPr>
+        <p:cNvPr id="1" name=""/>
+        <p:cNvGrpSpPr/>
+        <p:nvPr/>
+      </p:nvGrpSpPr>
+      <p:grpSpPr>
+        <a:xfrm>
+          <a:off x="0" y="0"/>
+          <a:ext cx="0" cy="0"/>
+          <a:chOff x="0" y="0"/>
+          <a:chExt cx="0" cy="0"/>
+        </a:xfrm>
+      </p:grpSpPr>
+      <p:sp>
+        <p:nvSpPr>
+          <p:cNvPr id="2" name="Title 1">
+            <a:extLst>
+              <a:ext uri="{FF2B5EF4-FFF2-40B4-BE49-F238E27FC236}">
+                <a16:creationId xmlns:a16="http://schemas.microsoft.com/office/drawing/2014/main" id="{56532D06-E3DD-8743-A24B-5D0E4F6AA76A}"/>
+              </a:ext>
+            </a:extLst>
+          </p:cNvPr>
+          <p:cNvSpPr>
+            <a:spLocks noGrp="1"/>
+          </p:cNvSpPr>
+          <p:nvPr>
+            <p:ph type="title"/>
+          </p:nvPr>
+        </p:nvSpPr>
+        <p:spPr>
+          <a:xfrm>
+            <a:off x="943131" y="2718581"/>
+            <a:ext cx="10515600" cy="1325563"/>
+          </a:xfrm>
+        </p:spPr>
+        <p:txBody>
+          <a:bodyPr/>
+          <a:lstStyle/>
+          <a:p>
+            <a:pPr algn="ctr"/>
+            <a:r>
+              <a:rPr lang="en-US" dirty="0"/>
+              <a:t>Route Distribution for Different Versions</a:t>
+            </a:r>
+          </a:p>
+        </p:txBody>
+      </p:sp>
+    </p:spTree>
+    <p:extLst>
+      <p:ext uri="{BB962C8B-B14F-4D97-AF65-F5344CB8AC3E}">
+        <p14:creationId xmlns:p14="http://schemas.microsoft.com/office/powerpoint/2010/main" val="2345452140"/>
+      </p:ext>
+    </p:extLst>
+  </p:cSld>
+  <p:clrMapOvr>
+    <a:masterClrMapping/>
+  </p:clrMapOvr>
+</p:sld>
+</file>
+
+<file path=ppt/slides/slide71.xml><?xml version="1.0" encoding="utf-8"?>
+<p:sld xmlns:a="http://schemas.openxmlformats.org/drawingml/2006/main" xmlns:r="http://schemas.openxmlformats.org/officeDocument/2006/relationships" xmlns:p="http://schemas.openxmlformats.org/presentationml/2006/main">
+  <p:cSld>
+    <p:spTree>
+      <p:nvGrpSpPr>
+        <p:cNvPr id="1" name=""/>
+        <p:cNvGrpSpPr/>
+        <p:nvPr/>
+      </p:nvGrpSpPr>
+      <p:grpSpPr>
+        <a:xfrm>
+          <a:off x="0" y="0"/>
+          <a:ext cx="0" cy="0"/>
+          <a:chOff x="0" y="0"/>
+          <a:chExt cx="0" cy="0"/>
+        </a:xfrm>
+      </p:grpSpPr>
+      <p:pic>
+        <p:nvPicPr>
+          <p:cNvPr id="5" name="Picture 4">
+            <a:extLst>
+              <a:ext uri="{FF2B5EF4-FFF2-40B4-BE49-F238E27FC236}">
+                <a16:creationId xmlns:a16="http://schemas.microsoft.com/office/drawing/2014/main" id="{57878F7A-3CDE-364C-B3EC-4524D65D09E4}"/>
+              </a:ext>
+            </a:extLst>
+          </p:cNvPr>
+          <p:cNvPicPr>
+            <a:picLocks noChangeAspect="1"/>
+          </p:cNvPicPr>
+          <p:nvPr/>
+        </p:nvPicPr>
+        <p:blipFill>
+          <a:blip r:embed="rId2"/>
+          <a:stretch>
+            <a:fillRect/>
+          </a:stretch>
+        </p:blipFill>
+        <p:spPr>
+          <a:xfrm>
+            <a:off x="236026" y="0"/>
+            <a:ext cx="11719947" cy="6858000"/>
+          </a:xfrm>
+          <a:prstGeom prst="rect">
+            <a:avLst/>
+          </a:prstGeom>
+        </p:spPr>
+      </p:pic>
+      <p:sp>
+        <p:nvSpPr>
+          <p:cNvPr id="6" name="TextBox 5">
+            <a:extLst>
+              <a:ext uri="{FF2B5EF4-FFF2-40B4-BE49-F238E27FC236}">
+                <a16:creationId xmlns:a16="http://schemas.microsoft.com/office/drawing/2014/main" id="{75812CBF-BE55-D445-940B-418365DCE916}"/>
+              </a:ext>
+            </a:extLst>
+          </p:cNvPr>
+          <p:cNvSpPr txBox="1"/>
+          <p:nvPr/>
+        </p:nvSpPr>
+        <p:spPr>
+          <a:xfrm>
+            <a:off x="236026" y="3244334"/>
+            <a:ext cx="1798819" cy="369332"/>
+          </a:xfrm>
+          <a:prstGeom prst="rect">
+            <a:avLst/>
+          </a:prstGeom>
+          <a:noFill/>
+        </p:spPr>
+        <p:txBody>
+          <a:bodyPr wrap="square" rtlCol="0">
+            <a:spAutoFit/>
+          </a:bodyPr>
+          <a:lstStyle/>
+          <a:p>
+            <a:r>
+              <a:rPr lang="en-US" dirty="0"/>
+              <a:t>Route 1</a:t>
+            </a:r>
+          </a:p>
+        </p:txBody>
+      </p:sp>
+    </p:spTree>
+    <p:extLst>
+      <p:ext uri="{BB962C8B-B14F-4D97-AF65-F5344CB8AC3E}">
+        <p14:creationId xmlns:p14="http://schemas.microsoft.com/office/powerpoint/2010/main" val="1197922693"/>
+      </p:ext>
+    </p:extLst>
+  </p:cSld>
+  <p:clrMapOvr>
+    <a:masterClrMapping/>
+  </p:clrMapOvr>
+</p:sld>
+</file>
+
+<file path=ppt/slides/slide72.xml><?xml version="1.0" encoding="utf-8"?>
+<p:sld xmlns:a="http://schemas.openxmlformats.org/drawingml/2006/main" xmlns:r="http://schemas.openxmlformats.org/officeDocument/2006/relationships" xmlns:p="http://schemas.openxmlformats.org/presentationml/2006/main">
+  <p:cSld>
+    <p:spTree>
+      <p:nvGrpSpPr>
+        <p:cNvPr id="1" name=""/>
+        <p:cNvGrpSpPr/>
+        <p:nvPr/>
+      </p:nvGrpSpPr>
+      <p:grpSpPr>
+        <a:xfrm>
+          <a:off x="0" y="0"/>
+          <a:ext cx="0" cy="0"/>
+          <a:chOff x="0" y="0"/>
+          <a:chExt cx="0" cy="0"/>
+        </a:xfrm>
+      </p:grpSpPr>
+      <p:pic>
+        <p:nvPicPr>
+          <p:cNvPr id="5" name="Picture 4">
+            <a:extLst>
+              <a:ext uri="{FF2B5EF4-FFF2-40B4-BE49-F238E27FC236}">
+                <a16:creationId xmlns:a16="http://schemas.microsoft.com/office/drawing/2014/main" id="{57878F7A-3CDE-364C-B3EC-4524D65D09E4}"/>
+              </a:ext>
+            </a:extLst>
+          </p:cNvPr>
+          <p:cNvPicPr>
+            <a:picLocks noChangeAspect="1"/>
+          </p:cNvPicPr>
+          <p:nvPr/>
+        </p:nvPicPr>
+        <p:blipFill>
+          <a:blip r:embed="rId2"/>
+          <a:stretch>
+            <a:fillRect/>
+          </a:stretch>
+        </p:blipFill>
+        <p:spPr>
+          <a:xfrm>
+            <a:off x="236026" y="0"/>
+            <a:ext cx="11719946" cy="6858000"/>
+          </a:xfrm>
+          <a:prstGeom prst="rect">
+            <a:avLst/>
+          </a:prstGeom>
+        </p:spPr>
+      </p:pic>
+      <p:sp>
+        <p:nvSpPr>
+          <p:cNvPr id="6" name="TextBox 5">
+            <a:extLst>
+              <a:ext uri="{FF2B5EF4-FFF2-40B4-BE49-F238E27FC236}">
+                <a16:creationId xmlns:a16="http://schemas.microsoft.com/office/drawing/2014/main" id="{75812CBF-BE55-D445-940B-418365DCE916}"/>
+              </a:ext>
+            </a:extLst>
+          </p:cNvPr>
+          <p:cNvSpPr txBox="1"/>
+          <p:nvPr/>
+        </p:nvSpPr>
+        <p:spPr>
+          <a:xfrm>
+            <a:off x="236026" y="3244334"/>
+            <a:ext cx="1798819" cy="369332"/>
+          </a:xfrm>
+          <a:prstGeom prst="rect">
+            <a:avLst/>
+          </a:prstGeom>
+          <a:noFill/>
+        </p:spPr>
+        <p:txBody>
+          <a:bodyPr wrap="square" rtlCol="0">
+            <a:spAutoFit/>
+          </a:bodyPr>
+          <a:lstStyle/>
+          <a:p>
+            <a:r>
+              <a:rPr lang="en-US" dirty="0"/>
+              <a:t>Route 60</a:t>
+            </a:r>
+          </a:p>
+        </p:txBody>
+      </p:sp>
+    </p:spTree>
+    <p:extLst>
+      <p:ext uri="{BB962C8B-B14F-4D97-AF65-F5344CB8AC3E}">
+        <p14:creationId xmlns:p14="http://schemas.microsoft.com/office/powerpoint/2010/main" val="454734510"/>
+      </p:ext>
+    </p:extLst>
+  </p:cSld>
+  <p:clrMapOvr>
+    <a:masterClrMapping/>
+  </p:clrMapOvr>
+</p:sld>
+</file>
+
+<file path=ppt/slides/slide73.xml><?xml version="1.0" encoding="utf-8"?>
+<p:sld xmlns:a="http://schemas.openxmlformats.org/drawingml/2006/main" xmlns:r="http://schemas.openxmlformats.org/officeDocument/2006/relationships" xmlns:p="http://schemas.openxmlformats.org/presentationml/2006/main">
+  <p:cSld>
+    <p:spTree>
+      <p:nvGrpSpPr>
+        <p:cNvPr id="1" name=""/>
+        <p:cNvGrpSpPr/>
+        <p:nvPr/>
+      </p:nvGrpSpPr>
+      <p:grpSpPr>
+        <a:xfrm>
+          <a:off x="0" y="0"/>
+          <a:ext cx="0" cy="0"/>
+          <a:chOff x="0" y="0"/>
+          <a:chExt cx="0" cy="0"/>
+        </a:xfrm>
+      </p:grpSpPr>
+      <p:pic>
+        <p:nvPicPr>
+          <p:cNvPr id="5" name="Picture 4">
+            <a:extLst>
+              <a:ext uri="{FF2B5EF4-FFF2-40B4-BE49-F238E27FC236}">
+                <a16:creationId xmlns:a16="http://schemas.microsoft.com/office/drawing/2014/main" id="{57878F7A-3CDE-364C-B3EC-4524D65D09E4}"/>
+              </a:ext>
+            </a:extLst>
+          </p:cNvPr>
+          <p:cNvPicPr>
+            <a:picLocks noChangeAspect="1"/>
+          </p:cNvPicPr>
+          <p:nvPr/>
+        </p:nvPicPr>
+        <p:blipFill>
+          <a:blip r:embed="rId2"/>
+          <a:stretch>
+            <a:fillRect/>
+          </a:stretch>
+        </p:blipFill>
+        <p:spPr>
+          <a:xfrm>
+            <a:off x="236026" y="0"/>
+            <a:ext cx="11719946" cy="6858000"/>
+          </a:xfrm>
+          <a:prstGeom prst="rect">
+            <a:avLst/>
+          </a:prstGeom>
+        </p:spPr>
+      </p:pic>
+      <p:sp>
+        <p:nvSpPr>
+          <p:cNvPr id="6" name="TextBox 5">
+            <a:extLst>
+              <a:ext uri="{FF2B5EF4-FFF2-40B4-BE49-F238E27FC236}">
+                <a16:creationId xmlns:a16="http://schemas.microsoft.com/office/drawing/2014/main" id="{75812CBF-BE55-D445-940B-418365DCE916}"/>
+              </a:ext>
+            </a:extLst>
+          </p:cNvPr>
+          <p:cNvSpPr txBox="1"/>
+          <p:nvPr/>
+        </p:nvSpPr>
+        <p:spPr>
+          <a:xfrm>
+            <a:off x="236026" y="3244334"/>
+            <a:ext cx="1798819" cy="369332"/>
+          </a:xfrm>
+          <a:prstGeom prst="rect">
+            <a:avLst/>
+          </a:prstGeom>
+          <a:noFill/>
+        </p:spPr>
+        <p:txBody>
+          <a:bodyPr wrap="square" rtlCol="0">
+            <a:spAutoFit/>
+          </a:bodyPr>
+          <a:lstStyle/>
+          <a:p>
+            <a:r>
+              <a:rPr lang="en-US" dirty="0"/>
+              <a:t>Route 120</a:t>
+            </a:r>
+          </a:p>
+        </p:txBody>
+      </p:sp>
+    </p:spTree>
+    <p:extLst>
+      <p:ext uri="{BB962C8B-B14F-4D97-AF65-F5344CB8AC3E}">
+        <p14:creationId xmlns:p14="http://schemas.microsoft.com/office/powerpoint/2010/main" val="3852429371"/>
       </p:ext>
     </p:extLst>
   </p:cSld>

</xml_diff>

<commit_message>
googlenet hd jc features
</commit_message>
<xml_diff>
--- a/BSD_Figures.pptx
+++ b/BSD_Figures.pptx
@@ -39915,7 +39915,7 @@
           <p:nvPr>
             <p:extLst>
               <p:ext uri="{D42A27DB-BD31-4B8C-83A1-F6EECF244321}">
-                <p14:modId xmlns:p14="http://schemas.microsoft.com/office/powerpoint/2010/main" val="2314427751"/>
+                <p14:modId xmlns:p14="http://schemas.microsoft.com/office/powerpoint/2010/main" val="430048143"/>
               </p:ext>
             </p:extLst>
           </p:nvPr>
@@ -40306,7 +40306,11 @@
                     <a:p>
                       <a:pPr algn="ctr"/>
                       <a:r>
-                        <a:rPr lang="en-US" dirty="0" err="1"/>
+                        <a:rPr lang="en-US" dirty="0" err="1">
+                          <a:solidFill>
+                            <a:srgbClr val="FF0000"/>
+                          </a:solidFill>
+                        </a:rPr>
                         <a:t>googlenet_recall</a:t>
                       </a:r>
                       <a:endParaRPr lang="en-US" dirty="0">
@@ -40712,7 +40716,7 @@
           <p:nvPr>
             <p:extLst>
               <p:ext uri="{D42A27DB-BD31-4B8C-83A1-F6EECF244321}">
-                <p14:modId xmlns:p14="http://schemas.microsoft.com/office/powerpoint/2010/main" val="117139876"/>
+                <p14:modId xmlns:p14="http://schemas.microsoft.com/office/powerpoint/2010/main" val="1907637377"/>
               </p:ext>
             </p:extLst>
           </p:nvPr>
@@ -40905,62 +40909,80 @@
                     <a:lstStyle/>
                     <a:p>
                       <a:pPr algn="ctr"/>
-                      <a:endParaRPr lang="en-US" dirty="0"/>
-                    </a:p>
-                  </a:txBody>
-                  <a:tcPr anchor="ctr"/>
-                </a:tc>
-                <a:tc>
-                  <a:txBody>
-                    <a:bodyPr/>
-                    <a:lstStyle/>
-                    <a:p>
-                      <a:pPr algn="ctr"/>
-                      <a:endParaRPr lang="en-US" dirty="0"/>
-                    </a:p>
-                  </a:txBody>
-                  <a:tcPr anchor="ctr"/>
-                </a:tc>
-                <a:tc>
-                  <a:txBody>
-                    <a:bodyPr/>
-                    <a:lstStyle/>
-                    <a:p>
-                      <a:pPr algn="ctr"/>
-                      <a:endParaRPr lang="en-US" dirty="0"/>
-                    </a:p>
-                  </a:txBody>
-                  <a:tcPr anchor="ctr"/>
-                </a:tc>
-                <a:tc>
-                  <a:txBody>
-                    <a:bodyPr/>
-                    <a:lstStyle/>
-                    <a:p>
-                      <a:pPr algn="ctr"/>
-                      <a:endParaRPr lang="en-US" dirty="0"/>
-                    </a:p>
-                  </a:txBody>
-                  <a:tcPr anchor="ctr"/>
-                </a:tc>
-                <a:tc>
-                  <a:txBody>
-                    <a:bodyPr/>
-                    <a:lstStyle/>
-                    <a:p>
-                      <a:pPr algn="ctr"/>
-                      <a:endParaRPr lang="en-US" dirty="0"/>
-                    </a:p>
-                  </a:txBody>
-                  <a:tcPr anchor="ctr"/>
-                </a:tc>
-                <a:tc>
-                  <a:txBody>
-                    <a:bodyPr/>
-                    <a:lstStyle/>
-                    <a:p>
-                      <a:pPr algn="ctr"/>
-                      <a:endParaRPr lang="en-US" dirty="0"/>
+                      <a:r>
+                        <a:rPr lang="en-US" dirty="0"/>
+                        <a:t>0.853</a:t>
+                      </a:r>
+                    </a:p>
+                  </a:txBody>
+                  <a:tcPr anchor="ctr"/>
+                </a:tc>
+                <a:tc>
+                  <a:txBody>
+                    <a:bodyPr/>
+                    <a:lstStyle/>
+                    <a:p>
+                      <a:pPr algn="ctr"/>
+                      <a:r>
+                        <a:rPr lang="en-US" dirty="0"/>
+                        <a:t>0.790</a:t>
+                      </a:r>
+                    </a:p>
+                  </a:txBody>
+                  <a:tcPr anchor="ctr"/>
+                </a:tc>
+                <a:tc>
+                  <a:txBody>
+                    <a:bodyPr/>
+                    <a:lstStyle/>
+                    <a:p>
+                      <a:pPr algn="ctr"/>
+                      <a:r>
+                        <a:rPr lang="en-US" dirty="0"/>
+                        <a:t>0.767</a:t>
+                      </a:r>
+                    </a:p>
+                  </a:txBody>
+                  <a:tcPr anchor="ctr"/>
+                </a:tc>
+                <a:tc>
+                  <a:txBody>
+                    <a:bodyPr/>
+                    <a:lstStyle/>
+                    <a:p>
+                      <a:pPr algn="ctr"/>
+                      <a:r>
+                        <a:rPr lang="en-US" dirty="0"/>
+                        <a:t>0.896</a:t>
+                      </a:r>
+                    </a:p>
+                  </a:txBody>
+                  <a:tcPr anchor="ctr"/>
+                </a:tc>
+                <a:tc>
+                  <a:txBody>
+                    <a:bodyPr/>
+                    <a:lstStyle/>
+                    <a:p>
+                      <a:pPr algn="ctr"/>
+                      <a:r>
+                        <a:rPr lang="en-US" dirty="0"/>
+                        <a:t>0.779</a:t>
+                      </a:r>
+                    </a:p>
+                  </a:txBody>
+                  <a:tcPr anchor="ctr"/>
+                </a:tc>
+                <a:tc>
+                  <a:txBody>
+                    <a:bodyPr/>
+                    <a:lstStyle/>
+                    <a:p>
+                      <a:pPr algn="ctr"/>
+                      <a:r>
+                        <a:rPr lang="en-US" dirty="0"/>
+                        <a:t>0.3744</a:t>
+                      </a:r>
                     </a:p>
                   </a:txBody>
                   <a:tcPr anchor="ctr"/>
@@ -40993,62 +41015,80 @@
                     <a:lstStyle/>
                     <a:p>
                       <a:pPr algn="ctr"/>
-                      <a:endParaRPr lang="en-US" dirty="0"/>
-                    </a:p>
-                  </a:txBody>
-                  <a:tcPr anchor="ctr"/>
-                </a:tc>
-                <a:tc>
-                  <a:txBody>
-                    <a:bodyPr/>
-                    <a:lstStyle/>
-                    <a:p>
-                      <a:pPr algn="ctr"/>
-                      <a:endParaRPr lang="en-US" dirty="0"/>
-                    </a:p>
-                  </a:txBody>
-                  <a:tcPr anchor="ctr"/>
-                </a:tc>
-                <a:tc>
-                  <a:txBody>
-                    <a:bodyPr/>
-                    <a:lstStyle/>
-                    <a:p>
-                      <a:pPr algn="ctr"/>
-                      <a:endParaRPr lang="en-US" dirty="0"/>
-                    </a:p>
-                  </a:txBody>
-                  <a:tcPr anchor="ctr"/>
-                </a:tc>
-                <a:tc>
-                  <a:txBody>
-                    <a:bodyPr/>
-                    <a:lstStyle/>
-                    <a:p>
-                      <a:pPr algn="ctr"/>
-                      <a:endParaRPr lang="en-US" dirty="0"/>
-                    </a:p>
-                  </a:txBody>
-                  <a:tcPr anchor="ctr"/>
-                </a:tc>
-                <a:tc>
-                  <a:txBody>
-                    <a:bodyPr/>
-                    <a:lstStyle/>
-                    <a:p>
-                      <a:pPr algn="ctr"/>
-                      <a:endParaRPr lang="en-US" dirty="0"/>
-                    </a:p>
-                  </a:txBody>
-                  <a:tcPr anchor="ctr"/>
-                </a:tc>
-                <a:tc>
-                  <a:txBody>
-                    <a:bodyPr/>
-                    <a:lstStyle/>
-                    <a:p>
-                      <a:pPr algn="ctr"/>
-                      <a:endParaRPr lang="en-US" dirty="0"/>
+                      <a:r>
+                        <a:rPr lang="en-US" dirty="0"/>
+                        <a:t>0.847</a:t>
+                      </a:r>
+                    </a:p>
+                  </a:txBody>
+                  <a:tcPr anchor="ctr"/>
+                </a:tc>
+                <a:tc>
+                  <a:txBody>
+                    <a:bodyPr/>
+                    <a:lstStyle/>
+                    <a:p>
+                      <a:pPr algn="ctr"/>
+                      <a:r>
+                        <a:rPr lang="en-US" dirty="0"/>
+                        <a:t>0.839</a:t>
+                      </a:r>
+                    </a:p>
+                  </a:txBody>
+                  <a:tcPr anchor="ctr"/>
+                </a:tc>
+                <a:tc>
+                  <a:txBody>
+                    <a:bodyPr/>
+                    <a:lstStyle/>
+                    <a:p>
+                      <a:pPr algn="ctr"/>
+                      <a:r>
+                        <a:rPr lang="en-US" dirty="0"/>
+                        <a:t>0.677</a:t>
+                      </a:r>
+                    </a:p>
+                  </a:txBody>
+                  <a:tcPr anchor="ctr"/>
+                </a:tc>
+                <a:tc>
+                  <a:txBody>
+                    <a:bodyPr/>
+                    <a:lstStyle/>
+                    <a:p>
+                      <a:pPr algn="ctr"/>
+                      <a:r>
+                        <a:rPr lang="en-US" dirty="0"/>
+                        <a:t>0.934</a:t>
+                      </a:r>
+                    </a:p>
+                  </a:txBody>
+                  <a:tcPr anchor="ctr"/>
+                </a:tc>
+                <a:tc>
+                  <a:txBody>
+                    <a:bodyPr/>
+                    <a:lstStyle/>
+                    <a:p>
+                      <a:pPr algn="ctr"/>
+                      <a:r>
+                        <a:rPr lang="en-US" dirty="0"/>
+                        <a:t>0.749</a:t>
+                      </a:r>
+                    </a:p>
+                  </a:txBody>
+                  <a:tcPr anchor="ctr"/>
+                </a:tc>
+                <a:tc>
+                  <a:txBody>
+                    <a:bodyPr/>
+                    <a:lstStyle/>
+                    <a:p>
+                      <a:pPr algn="ctr"/>
+                      <a:r>
+                        <a:rPr lang="en-US" dirty="0"/>
+                        <a:t>0.3744</a:t>
+                      </a:r>
                     </a:p>
                   </a:txBody>
                   <a:tcPr anchor="ctr"/>
@@ -41067,7 +41107,11 @@
                     <a:p>
                       <a:pPr algn="ctr"/>
                       <a:r>
-                        <a:rPr lang="en-US" dirty="0" err="1"/>
+                        <a:rPr lang="en-US" dirty="0" err="1">
+                          <a:solidFill>
+                            <a:srgbClr val="FF0000"/>
+                          </a:solidFill>
+                        </a:rPr>
                         <a:t>googlenet_recall</a:t>
                       </a:r>
                       <a:endParaRPr lang="en-US" dirty="0">
@@ -41085,86 +41129,104 @@
                     <a:lstStyle/>
                     <a:p>
                       <a:pPr algn="ctr"/>
-                      <a:endParaRPr lang="en-US" dirty="0">
-                        <a:solidFill>
-                          <a:srgbClr val="FF0000"/>
-                        </a:solidFill>
-                      </a:endParaRPr>
-                    </a:p>
-                  </a:txBody>
-                  <a:tcPr anchor="ctr"/>
-                </a:tc>
-                <a:tc>
-                  <a:txBody>
-                    <a:bodyPr/>
-                    <a:lstStyle/>
-                    <a:p>
-                      <a:pPr algn="ctr"/>
-                      <a:endParaRPr lang="en-US" dirty="0">
-                        <a:solidFill>
-                          <a:srgbClr val="FF0000"/>
-                        </a:solidFill>
-                      </a:endParaRPr>
-                    </a:p>
-                  </a:txBody>
-                  <a:tcPr anchor="ctr"/>
-                </a:tc>
-                <a:tc>
-                  <a:txBody>
-                    <a:bodyPr/>
-                    <a:lstStyle/>
-                    <a:p>
-                      <a:pPr algn="ctr"/>
-                      <a:endParaRPr lang="en-US" dirty="0">
-                        <a:solidFill>
-                          <a:srgbClr val="FF0000"/>
-                        </a:solidFill>
-                      </a:endParaRPr>
-                    </a:p>
-                  </a:txBody>
-                  <a:tcPr anchor="ctr"/>
-                </a:tc>
-                <a:tc>
-                  <a:txBody>
-                    <a:bodyPr/>
-                    <a:lstStyle/>
-                    <a:p>
-                      <a:pPr algn="ctr"/>
-                      <a:endParaRPr lang="en-US" dirty="0">
-                        <a:solidFill>
-                          <a:srgbClr val="FF0000"/>
-                        </a:solidFill>
-                      </a:endParaRPr>
-                    </a:p>
-                  </a:txBody>
-                  <a:tcPr anchor="ctr"/>
-                </a:tc>
-                <a:tc>
-                  <a:txBody>
-                    <a:bodyPr/>
-                    <a:lstStyle/>
-                    <a:p>
-                      <a:pPr algn="ctr"/>
-                      <a:endParaRPr lang="en-US" dirty="0">
-                        <a:solidFill>
-                          <a:srgbClr val="FF0000"/>
-                        </a:solidFill>
-                      </a:endParaRPr>
-                    </a:p>
-                  </a:txBody>
-                  <a:tcPr anchor="ctr"/>
-                </a:tc>
-                <a:tc>
-                  <a:txBody>
-                    <a:bodyPr/>
-                    <a:lstStyle/>
-                    <a:p>
-                      <a:pPr algn="ctr"/>
-                      <a:endParaRPr lang="en-US" dirty="0">
-                        <a:solidFill>
-                          <a:srgbClr val="FF0000"/>
-                        </a:solidFill>
-                      </a:endParaRPr>
+                      <a:r>
+                        <a:rPr lang="en-US" dirty="0">
+                          <a:solidFill>
+                            <a:srgbClr val="FF0000"/>
+                          </a:solidFill>
+                        </a:rPr>
+                        <a:t>0.819</a:t>
+                      </a:r>
+                    </a:p>
+                  </a:txBody>
+                  <a:tcPr anchor="ctr"/>
+                </a:tc>
+                <a:tc>
+                  <a:txBody>
+                    <a:bodyPr/>
+                    <a:lstStyle/>
+                    <a:p>
+                      <a:pPr algn="ctr"/>
+                      <a:r>
+                        <a:rPr lang="en-US" dirty="0">
+                          <a:solidFill>
+                            <a:srgbClr val="FF0000"/>
+                          </a:solidFill>
+                        </a:rPr>
+                        <a:t>0.697</a:t>
+                      </a:r>
+                    </a:p>
+                  </a:txBody>
+                  <a:tcPr anchor="ctr"/>
+                </a:tc>
+                <a:tc>
+                  <a:txBody>
+                    <a:bodyPr/>
+                    <a:lstStyle/>
+                    <a:p>
+                      <a:pPr algn="ctr"/>
+                      <a:r>
+                        <a:rPr lang="en-US" dirty="0">
+                          <a:solidFill>
+                            <a:srgbClr val="FF0000"/>
+                          </a:solidFill>
+                        </a:rPr>
+                        <a:t>0.816</a:t>
+                      </a:r>
+                    </a:p>
+                  </a:txBody>
+                  <a:tcPr anchor="ctr"/>
+                </a:tc>
+                <a:tc>
+                  <a:txBody>
+                    <a:bodyPr/>
+                    <a:lstStyle/>
+                    <a:p>
+                      <a:pPr algn="ctr"/>
+                      <a:r>
+                        <a:rPr lang="en-US" dirty="0">
+                          <a:solidFill>
+                            <a:srgbClr val="FF0000"/>
+                          </a:solidFill>
+                        </a:rPr>
+                        <a:t>0.820</a:t>
+                      </a:r>
+                    </a:p>
+                  </a:txBody>
+                  <a:tcPr anchor="ctr"/>
+                </a:tc>
+                <a:tc>
+                  <a:txBody>
+                    <a:bodyPr/>
+                    <a:lstStyle/>
+                    <a:p>
+                      <a:pPr algn="ctr"/>
+                      <a:r>
+                        <a:rPr lang="en-US" dirty="0">
+                          <a:solidFill>
+                            <a:srgbClr val="FF0000"/>
+                          </a:solidFill>
+                        </a:rPr>
+                        <a:t>0.752</a:t>
+                      </a:r>
+                    </a:p>
+                  </a:txBody>
+                  <a:tcPr anchor="ctr"/>
+                </a:tc>
+                <a:tc>
+                  <a:txBody>
+                    <a:bodyPr/>
+                    <a:lstStyle/>
+                    <a:p>
+                      <a:pPr algn="ctr"/>
+                      <a:r>
+                        <a:rPr lang="en-US" dirty="0">
+                          <a:solidFill>
+                            <a:srgbClr val="FF0000"/>
+                          </a:solidFill>
+                        </a:rPr>
+                        <a:t>0.9594</a:t>
+                      </a:r>
                     </a:p>
                   </a:txBody>
                   <a:tcPr anchor="ctr"/>
@@ -41196,62 +41258,80 @@
                     <a:lstStyle/>
                     <a:p>
                       <a:pPr algn="ctr"/>
-                      <a:endParaRPr lang="en-US" dirty="0"/>
-                    </a:p>
-                  </a:txBody>
-                  <a:tcPr anchor="ctr"/>
-                </a:tc>
-                <a:tc>
-                  <a:txBody>
-                    <a:bodyPr/>
-                    <a:lstStyle/>
-                    <a:p>
-                      <a:pPr algn="ctr"/>
-                      <a:endParaRPr lang="en-US" dirty="0"/>
-                    </a:p>
-                  </a:txBody>
-                  <a:tcPr anchor="ctr"/>
-                </a:tc>
-                <a:tc>
-                  <a:txBody>
-                    <a:bodyPr/>
-                    <a:lstStyle/>
-                    <a:p>
-                      <a:pPr algn="ctr"/>
-                      <a:endParaRPr lang="en-US" dirty="0"/>
-                    </a:p>
-                  </a:txBody>
-                  <a:tcPr anchor="ctr"/>
-                </a:tc>
-                <a:tc>
-                  <a:txBody>
-                    <a:bodyPr/>
-                    <a:lstStyle/>
-                    <a:p>
-                      <a:pPr algn="ctr"/>
-                      <a:endParaRPr lang="en-US" dirty="0"/>
-                    </a:p>
-                  </a:txBody>
-                  <a:tcPr anchor="ctr"/>
-                </a:tc>
-                <a:tc>
-                  <a:txBody>
-                    <a:bodyPr/>
-                    <a:lstStyle/>
-                    <a:p>
-                      <a:pPr algn="ctr"/>
-                      <a:endParaRPr lang="en-US" dirty="0"/>
-                    </a:p>
-                  </a:txBody>
-                  <a:tcPr anchor="ctr"/>
-                </a:tc>
-                <a:tc>
-                  <a:txBody>
-                    <a:bodyPr/>
-                    <a:lstStyle/>
-                    <a:p>
-                      <a:pPr algn="ctr"/>
-                      <a:endParaRPr lang="en-US" dirty="0"/>
+                      <a:r>
+                        <a:rPr lang="en-US" dirty="0"/>
+                        <a:t>0.853</a:t>
+                      </a:r>
+                    </a:p>
+                  </a:txBody>
+                  <a:tcPr anchor="ctr"/>
+                </a:tc>
+                <a:tc>
+                  <a:txBody>
+                    <a:bodyPr/>
+                    <a:lstStyle/>
+                    <a:p>
+                      <a:pPr algn="ctr"/>
+                      <a:r>
+                        <a:rPr lang="en-US" dirty="0"/>
+                        <a:t>0.790</a:t>
+                      </a:r>
+                    </a:p>
+                  </a:txBody>
+                  <a:tcPr anchor="ctr"/>
+                </a:tc>
+                <a:tc>
+                  <a:txBody>
+                    <a:bodyPr/>
+                    <a:lstStyle/>
+                    <a:p>
+                      <a:pPr algn="ctr"/>
+                      <a:r>
+                        <a:rPr lang="en-US" dirty="0"/>
+                        <a:t>0.767</a:t>
+                      </a:r>
+                    </a:p>
+                  </a:txBody>
+                  <a:tcPr anchor="ctr"/>
+                </a:tc>
+                <a:tc>
+                  <a:txBody>
+                    <a:bodyPr/>
+                    <a:lstStyle/>
+                    <a:p>
+                      <a:pPr algn="ctr"/>
+                      <a:r>
+                        <a:rPr lang="en-US" dirty="0"/>
+                        <a:t>0.896</a:t>
+                      </a:r>
+                    </a:p>
+                  </a:txBody>
+                  <a:tcPr anchor="ctr"/>
+                </a:tc>
+                <a:tc>
+                  <a:txBody>
+                    <a:bodyPr/>
+                    <a:lstStyle/>
+                    <a:p>
+                      <a:pPr algn="ctr"/>
+                      <a:r>
+                        <a:rPr lang="en-US" dirty="0"/>
+                        <a:t>0.779</a:t>
+                      </a:r>
+                    </a:p>
+                  </a:txBody>
+                  <a:tcPr anchor="ctr"/>
+                </a:tc>
+                <a:tc>
+                  <a:txBody>
+                    <a:bodyPr/>
+                    <a:lstStyle/>
+                    <a:p>
+                      <a:pPr algn="ctr"/>
+                      <a:r>
+                        <a:rPr lang="en-US" dirty="0"/>
+                        <a:t>0.3744</a:t>
+                      </a:r>
                     </a:p>
                   </a:txBody>
                   <a:tcPr anchor="ctr"/>
@@ -41304,62 +41384,80 @@
                     <a:lstStyle/>
                     <a:p>
                       <a:pPr algn="ctr"/>
-                      <a:endParaRPr lang="en-US" dirty="0"/>
-                    </a:p>
-                  </a:txBody>
-                  <a:tcPr anchor="ctr"/>
-                </a:tc>
-                <a:tc>
-                  <a:txBody>
-                    <a:bodyPr/>
-                    <a:lstStyle/>
-                    <a:p>
-                      <a:pPr algn="ctr"/>
-                      <a:endParaRPr lang="en-US" dirty="0"/>
-                    </a:p>
-                  </a:txBody>
-                  <a:tcPr anchor="ctr"/>
-                </a:tc>
-                <a:tc>
-                  <a:txBody>
-                    <a:bodyPr/>
-                    <a:lstStyle/>
-                    <a:p>
-                      <a:pPr algn="ctr"/>
-                      <a:endParaRPr lang="en-US" dirty="0"/>
-                    </a:p>
-                  </a:txBody>
-                  <a:tcPr anchor="ctr"/>
-                </a:tc>
-                <a:tc>
-                  <a:txBody>
-                    <a:bodyPr/>
-                    <a:lstStyle/>
-                    <a:p>
-                      <a:pPr algn="ctr"/>
-                      <a:endParaRPr lang="en-US" dirty="0"/>
-                    </a:p>
-                  </a:txBody>
-                  <a:tcPr anchor="ctr"/>
-                </a:tc>
-                <a:tc>
-                  <a:txBody>
-                    <a:bodyPr/>
-                    <a:lstStyle/>
-                    <a:p>
-                      <a:pPr algn="ctr"/>
-                      <a:endParaRPr lang="en-US" dirty="0"/>
-                    </a:p>
-                  </a:txBody>
-                  <a:tcPr anchor="ctr"/>
-                </a:tc>
-                <a:tc>
-                  <a:txBody>
-                    <a:bodyPr/>
-                    <a:lstStyle/>
-                    <a:p>
-                      <a:pPr algn="ctr"/>
-                      <a:endParaRPr lang="en-US" dirty="0"/>
+                      <a:r>
+                        <a:rPr lang="en-US" dirty="0"/>
+                        <a:t>0.849</a:t>
+                      </a:r>
+                    </a:p>
+                  </a:txBody>
+                  <a:tcPr anchor="ctr"/>
+                </a:tc>
+                <a:tc>
+                  <a:txBody>
+                    <a:bodyPr/>
+                    <a:lstStyle/>
+                    <a:p>
+                      <a:pPr algn="ctr"/>
+                      <a:r>
+                        <a:rPr lang="en-US" dirty="0"/>
+                        <a:t>0.804</a:t>
+                      </a:r>
+                    </a:p>
+                  </a:txBody>
+                  <a:tcPr anchor="ctr"/>
+                </a:tc>
+                <a:tc>
+                  <a:txBody>
+                    <a:bodyPr/>
+                    <a:lstStyle/>
+                    <a:p>
+                      <a:pPr algn="ctr"/>
+                      <a:r>
+                        <a:rPr lang="en-US" dirty="0"/>
+                        <a:t>0.732</a:t>
+                      </a:r>
+                    </a:p>
+                  </a:txBody>
+                  <a:tcPr anchor="ctr"/>
+                </a:tc>
+                <a:tc>
+                  <a:txBody>
+                    <a:bodyPr/>
+                    <a:lstStyle/>
+                    <a:p>
+                      <a:pPr algn="ctr"/>
+                      <a:r>
+                        <a:rPr lang="en-US" dirty="0"/>
+                        <a:t>0.909</a:t>
+                      </a:r>
+                    </a:p>
+                  </a:txBody>
+                  <a:tcPr anchor="ctr"/>
+                </a:tc>
+                <a:tc>
+                  <a:txBody>
+                    <a:bodyPr/>
+                    <a:lstStyle/>
+                    <a:p>
+                      <a:pPr algn="ctr"/>
+                      <a:r>
+                        <a:rPr lang="en-US" dirty="0"/>
+                        <a:t>0.766</a:t>
+                      </a:r>
+                    </a:p>
+                  </a:txBody>
+                  <a:tcPr anchor="ctr"/>
+                </a:tc>
+                <a:tc>
+                  <a:txBody>
+                    <a:bodyPr/>
+                    <a:lstStyle/>
+                    <a:p>
+                      <a:pPr algn="ctr"/>
+                      <a:r>
+                        <a:rPr lang="en-US" dirty="0"/>
+                        <a:t>0.3541</a:t>
+                      </a:r>
                     </a:p>
                   </a:txBody>
                   <a:tcPr anchor="ctr"/>
@@ -45478,7 +45576,7 @@
           <p:nvPr>
             <p:extLst>
               <p:ext uri="{D42A27DB-BD31-4B8C-83A1-F6EECF244321}">
-                <p14:modId xmlns:p14="http://schemas.microsoft.com/office/powerpoint/2010/main" val="1641913330"/>
+                <p14:modId xmlns:p14="http://schemas.microsoft.com/office/powerpoint/2010/main" val="112163471"/>
               </p:ext>
             </p:extLst>
           </p:nvPr>
@@ -45670,57 +45768,81 @@
                     <a:bodyPr/>
                     <a:lstStyle/>
                     <a:p>
-                      <a:endParaRPr lang="en-US"/>
-                    </a:p>
-                  </a:txBody>
-                  <a:tcPr anchor="ctr"/>
-                </a:tc>
-                <a:tc>
-                  <a:txBody>
-                    <a:bodyPr/>
-                    <a:lstStyle/>
-                    <a:p>
-                      <a:endParaRPr lang="en-US"/>
-                    </a:p>
-                  </a:txBody>
-                  <a:tcPr anchor="ctr"/>
-                </a:tc>
-                <a:tc>
-                  <a:txBody>
-                    <a:bodyPr/>
-                    <a:lstStyle/>
-                    <a:p>
-                      <a:endParaRPr lang="en-US"/>
-                    </a:p>
-                  </a:txBody>
-                  <a:tcPr anchor="ctr"/>
-                </a:tc>
-                <a:tc>
-                  <a:txBody>
-                    <a:bodyPr/>
-                    <a:lstStyle/>
-                    <a:p>
-                      <a:endParaRPr lang="en-US"/>
-                    </a:p>
-                  </a:txBody>
-                  <a:tcPr anchor="ctr"/>
-                </a:tc>
-                <a:tc>
-                  <a:txBody>
-                    <a:bodyPr/>
-                    <a:lstStyle/>
-                    <a:p>
-                      <a:endParaRPr lang="en-US"/>
-                    </a:p>
-                  </a:txBody>
-                  <a:tcPr anchor="ctr"/>
-                </a:tc>
-                <a:tc>
-                  <a:txBody>
-                    <a:bodyPr/>
-                    <a:lstStyle/>
-                    <a:p>
-                      <a:endParaRPr lang="en-US" dirty="0"/>
+                      <a:pPr algn="ctr"/>
+                      <a:r>
+                        <a:rPr lang="en-US" dirty="0"/>
+                        <a:t>0.804</a:t>
+                      </a:r>
+                    </a:p>
+                  </a:txBody>
+                  <a:tcPr anchor="ctr"/>
+                </a:tc>
+                <a:tc>
+                  <a:txBody>
+                    <a:bodyPr/>
+                    <a:lstStyle/>
+                    <a:p>
+                      <a:pPr algn="ctr"/>
+                      <a:r>
+                        <a:rPr lang="en-US" dirty="0"/>
+                        <a:t>0.759</a:t>
+                      </a:r>
+                    </a:p>
+                  </a:txBody>
+                  <a:tcPr anchor="ctr"/>
+                </a:tc>
+                <a:tc>
+                  <a:txBody>
+                    <a:bodyPr/>
+                    <a:lstStyle/>
+                    <a:p>
+                      <a:pPr algn="ctr"/>
+                      <a:r>
+                        <a:rPr lang="en-US" dirty="0"/>
+                        <a:t>0.754</a:t>
+                      </a:r>
+                    </a:p>
+                  </a:txBody>
+                  <a:tcPr anchor="ctr"/>
+                </a:tc>
+                <a:tc>
+                  <a:txBody>
+                    <a:bodyPr/>
+                    <a:lstStyle/>
+                    <a:p>
+                      <a:pPr algn="ctr"/>
+                      <a:r>
+                        <a:rPr lang="en-US" dirty="0"/>
+                        <a:t>0.839</a:t>
+                      </a:r>
+                    </a:p>
+                  </a:txBody>
+                  <a:tcPr anchor="ctr"/>
+                </a:tc>
+                <a:tc>
+                  <a:txBody>
+                    <a:bodyPr/>
+                    <a:lstStyle/>
+                    <a:p>
+                      <a:pPr algn="ctr"/>
+                      <a:r>
+                        <a:rPr lang="en-US" dirty="0"/>
+                        <a:t>0.756</a:t>
+                      </a:r>
+                    </a:p>
+                  </a:txBody>
+                  <a:tcPr anchor="ctr"/>
+                </a:tc>
+                <a:tc>
+                  <a:txBody>
+                    <a:bodyPr/>
+                    <a:lstStyle/>
+                    <a:p>
+                      <a:pPr algn="ctr"/>
+                      <a:r>
+                        <a:rPr lang="en-US" dirty="0"/>
+                        <a:t>0.4504</a:t>
+                      </a:r>
                     </a:p>
                   </a:txBody>
                   <a:tcPr anchor="ctr"/>
@@ -45753,62 +45875,80 @@
                     <a:lstStyle/>
                     <a:p>
                       <a:pPr algn="ctr"/>
-                      <a:endParaRPr lang="en-US" dirty="0"/>
-                    </a:p>
-                  </a:txBody>
-                  <a:tcPr anchor="ctr"/>
-                </a:tc>
-                <a:tc>
-                  <a:txBody>
-                    <a:bodyPr/>
-                    <a:lstStyle/>
-                    <a:p>
-                      <a:pPr algn="ctr"/>
-                      <a:endParaRPr lang="en-US" dirty="0"/>
-                    </a:p>
-                  </a:txBody>
-                  <a:tcPr anchor="ctr"/>
-                </a:tc>
-                <a:tc>
-                  <a:txBody>
-                    <a:bodyPr/>
-                    <a:lstStyle/>
-                    <a:p>
-                      <a:pPr algn="ctr"/>
-                      <a:endParaRPr lang="en-US" dirty="0"/>
-                    </a:p>
-                  </a:txBody>
-                  <a:tcPr anchor="ctr"/>
-                </a:tc>
-                <a:tc>
-                  <a:txBody>
-                    <a:bodyPr/>
-                    <a:lstStyle/>
-                    <a:p>
-                      <a:pPr algn="ctr"/>
-                      <a:endParaRPr lang="en-US" dirty="0"/>
-                    </a:p>
-                  </a:txBody>
-                  <a:tcPr anchor="ctr"/>
-                </a:tc>
-                <a:tc>
-                  <a:txBody>
-                    <a:bodyPr/>
-                    <a:lstStyle/>
-                    <a:p>
-                      <a:pPr algn="ctr"/>
-                      <a:endParaRPr lang="en-US" dirty="0"/>
-                    </a:p>
-                  </a:txBody>
-                  <a:tcPr anchor="ctr"/>
-                </a:tc>
-                <a:tc>
-                  <a:txBody>
-                    <a:bodyPr/>
-                    <a:lstStyle/>
-                    <a:p>
-                      <a:pPr algn="ctr"/>
-                      <a:endParaRPr lang="en-US" dirty="0"/>
+                      <a:r>
+                        <a:rPr lang="en-US" dirty="0"/>
+                        <a:t>0.799</a:t>
+                      </a:r>
+                    </a:p>
+                  </a:txBody>
+                  <a:tcPr anchor="ctr"/>
+                </a:tc>
+                <a:tc>
+                  <a:txBody>
+                    <a:bodyPr/>
+                    <a:lstStyle/>
+                    <a:p>
+                      <a:pPr algn="ctr"/>
+                      <a:r>
+                        <a:rPr lang="en-US" dirty="0"/>
+                        <a:t>0.808</a:t>
+                      </a:r>
+                    </a:p>
+                  </a:txBody>
+                  <a:tcPr anchor="ctr"/>
+                </a:tc>
+                <a:tc>
+                  <a:txBody>
+                    <a:bodyPr/>
+                    <a:lstStyle/>
+                    <a:p>
+                      <a:pPr algn="ctr"/>
+                      <a:r>
+                        <a:rPr lang="en-US" dirty="0"/>
+                        <a:t>0.656</a:t>
+                      </a:r>
+                    </a:p>
+                  </a:txBody>
+                  <a:tcPr anchor="ctr"/>
+                </a:tc>
+                <a:tc>
+                  <a:txBody>
+                    <a:bodyPr/>
+                    <a:lstStyle/>
+                    <a:p>
+                      <a:pPr algn="ctr"/>
+                      <a:r>
+                        <a:rPr lang="en-US" dirty="0"/>
+                        <a:t>0.895</a:t>
+                      </a:r>
+                    </a:p>
+                  </a:txBody>
+                  <a:tcPr anchor="ctr"/>
+                </a:tc>
+                <a:tc>
+                  <a:txBody>
+                    <a:bodyPr/>
+                    <a:lstStyle/>
+                    <a:p>
+                      <a:pPr algn="ctr"/>
+                      <a:r>
+                        <a:rPr lang="en-US" dirty="0"/>
+                        <a:t>0.724</a:t>
+                      </a:r>
+                    </a:p>
+                  </a:txBody>
+                  <a:tcPr anchor="ctr"/>
+                </a:tc>
+                <a:tc>
+                  <a:txBody>
+                    <a:bodyPr/>
+                    <a:lstStyle/>
+                    <a:p>
+                      <a:pPr algn="ctr"/>
+                      <a:r>
+                        <a:rPr lang="en-US" dirty="0"/>
+                        <a:t>0.4493</a:t>
+                      </a:r>
                     </a:p>
                   </a:txBody>
                   <a:tcPr anchor="ctr"/>
@@ -45845,86 +45985,100 @@
                     <a:lstStyle/>
                     <a:p>
                       <a:pPr algn="ctr"/>
-                      <a:endParaRPr lang="en-US" dirty="0">
-                        <a:solidFill>
-                          <a:srgbClr val="FF0000"/>
-                        </a:solidFill>
-                      </a:endParaRPr>
-                    </a:p>
-                  </a:txBody>
-                  <a:tcPr anchor="ctr"/>
-                </a:tc>
-                <a:tc>
-                  <a:txBody>
-                    <a:bodyPr/>
-                    <a:lstStyle/>
-                    <a:p>
-                      <a:pPr algn="ctr"/>
-                      <a:endParaRPr lang="en-US" dirty="0">
-                        <a:solidFill>
-                          <a:srgbClr val="FF0000"/>
-                        </a:solidFill>
-                      </a:endParaRPr>
-                    </a:p>
-                  </a:txBody>
-                  <a:tcPr anchor="ctr"/>
-                </a:tc>
-                <a:tc>
-                  <a:txBody>
-                    <a:bodyPr/>
-                    <a:lstStyle/>
-                    <a:p>
-                      <a:pPr algn="ctr"/>
-                      <a:endParaRPr lang="en-US" dirty="0">
-                        <a:solidFill>
-                          <a:srgbClr val="FF0000"/>
-                        </a:solidFill>
-                      </a:endParaRPr>
-                    </a:p>
-                  </a:txBody>
-                  <a:tcPr anchor="ctr"/>
-                </a:tc>
-                <a:tc>
-                  <a:txBody>
-                    <a:bodyPr/>
-                    <a:lstStyle/>
-                    <a:p>
-                      <a:pPr algn="ctr"/>
-                      <a:endParaRPr lang="en-US" dirty="0">
-                        <a:solidFill>
-                          <a:srgbClr val="FF0000"/>
-                        </a:solidFill>
-                      </a:endParaRPr>
-                    </a:p>
-                  </a:txBody>
-                  <a:tcPr anchor="ctr"/>
-                </a:tc>
-                <a:tc>
-                  <a:txBody>
-                    <a:bodyPr/>
-                    <a:lstStyle/>
-                    <a:p>
-                      <a:pPr algn="ctr"/>
-                      <a:endParaRPr lang="en-US" dirty="0">
-                        <a:solidFill>
-                          <a:srgbClr val="FF0000"/>
-                        </a:solidFill>
-                      </a:endParaRPr>
-                    </a:p>
-                  </a:txBody>
-                  <a:tcPr anchor="ctr"/>
-                </a:tc>
-                <a:tc>
-                  <a:txBody>
-                    <a:bodyPr/>
-                    <a:lstStyle/>
-                    <a:p>
-                      <a:pPr algn="ctr"/>
-                      <a:endParaRPr lang="en-US" dirty="0">
-                        <a:solidFill>
-                          <a:srgbClr val="FF0000"/>
-                        </a:solidFill>
-                      </a:endParaRPr>
+                      <a:r>
+                        <a:rPr lang="en-US" dirty="0">
+                          <a:solidFill>
+                            <a:srgbClr val="FF0000"/>
+                          </a:solidFill>
+                        </a:rPr>
+                        <a:t>0.777</a:t>
+                      </a:r>
+                    </a:p>
+                  </a:txBody>
+                  <a:tcPr anchor="ctr"/>
+                </a:tc>
+                <a:tc>
+                  <a:txBody>
+                    <a:bodyPr/>
+                    <a:lstStyle/>
+                    <a:p>
+                      <a:pPr algn="ctr"/>
+                      <a:r>
+                        <a:rPr lang="en-US" dirty="0">
+                          <a:solidFill>
+                            <a:srgbClr val="FF0000"/>
+                          </a:solidFill>
+                        </a:rPr>
+                        <a:t>0.701</a:t>
+                      </a:r>
+                    </a:p>
+                  </a:txBody>
+                  <a:tcPr anchor="ctr"/>
+                </a:tc>
+                <a:tc>
+                  <a:txBody>
+                    <a:bodyPr/>
+                    <a:lstStyle/>
+                    <a:p>
+                      <a:pPr algn="ctr"/>
+                      <a:r>
+                        <a:rPr lang="en-US" dirty="0"/>
+                        <a:t>0.777</a:t>
+                      </a:r>
+                    </a:p>
+                  </a:txBody>
+                  <a:tcPr anchor="ctr"/>
+                </a:tc>
+                <a:tc>
+                  <a:txBody>
+                    <a:bodyPr/>
+                    <a:lstStyle/>
+                    <a:p>
+                      <a:pPr algn="ctr"/>
+                      <a:r>
+                        <a:rPr lang="en-US" dirty="0">
+                          <a:solidFill>
+                            <a:srgbClr val="FF0000"/>
+                          </a:solidFill>
+                        </a:rPr>
+                        <a:t>0.777</a:t>
+                      </a:r>
+                    </a:p>
+                  </a:txBody>
+                  <a:tcPr anchor="ctr"/>
+                </a:tc>
+                <a:tc>
+                  <a:txBody>
+                    <a:bodyPr/>
+                    <a:lstStyle/>
+                    <a:p>
+                      <a:pPr algn="ctr"/>
+                      <a:r>
+                        <a:rPr lang="en-US" dirty="0">
+                          <a:solidFill>
+                            <a:srgbClr val="FF0000"/>
+                          </a:solidFill>
+                        </a:rPr>
+                        <a:t>0.737</a:t>
+                      </a:r>
+                    </a:p>
+                  </a:txBody>
+                  <a:tcPr anchor="ctr"/>
+                </a:tc>
+                <a:tc>
+                  <a:txBody>
+                    <a:bodyPr/>
+                    <a:lstStyle/>
+                    <a:p>
+                      <a:pPr algn="ctr"/>
+                      <a:r>
+                        <a:rPr lang="en-US" dirty="0">
+                          <a:solidFill>
+                            <a:srgbClr val="FF0000"/>
+                          </a:solidFill>
+                        </a:rPr>
+                        <a:t>1.0550</a:t>
+                      </a:r>
                     </a:p>
                   </a:txBody>
                   <a:tcPr anchor="ctr"/>
@@ -45956,62 +46110,80 @@
                     <a:lstStyle/>
                     <a:p>
                       <a:pPr algn="ctr"/>
-                      <a:endParaRPr lang="en-US" dirty="0"/>
-                    </a:p>
-                  </a:txBody>
-                  <a:tcPr anchor="ctr"/>
-                </a:tc>
-                <a:tc>
-                  <a:txBody>
-                    <a:bodyPr/>
-                    <a:lstStyle/>
-                    <a:p>
-                      <a:pPr algn="ctr"/>
-                      <a:endParaRPr lang="en-US" dirty="0"/>
-                    </a:p>
-                  </a:txBody>
-                  <a:tcPr anchor="ctr"/>
-                </a:tc>
-                <a:tc>
-                  <a:txBody>
-                    <a:bodyPr/>
-                    <a:lstStyle/>
-                    <a:p>
-                      <a:pPr algn="ctr"/>
-                      <a:endParaRPr lang="en-US" dirty="0"/>
-                    </a:p>
-                  </a:txBody>
-                  <a:tcPr anchor="ctr"/>
-                </a:tc>
-                <a:tc>
-                  <a:txBody>
-                    <a:bodyPr/>
-                    <a:lstStyle/>
-                    <a:p>
-                      <a:pPr algn="ctr"/>
-                      <a:endParaRPr lang="en-US" dirty="0"/>
-                    </a:p>
-                  </a:txBody>
-                  <a:tcPr anchor="ctr"/>
-                </a:tc>
-                <a:tc>
-                  <a:txBody>
-                    <a:bodyPr/>
-                    <a:lstStyle/>
-                    <a:p>
-                      <a:pPr algn="ctr"/>
-                      <a:endParaRPr lang="en-US" dirty="0"/>
-                    </a:p>
-                  </a:txBody>
-                  <a:tcPr anchor="ctr"/>
-                </a:tc>
-                <a:tc>
-                  <a:txBody>
-                    <a:bodyPr/>
-                    <a:lstStyle/>
-                    <a:p>
-                      <a:pPr algn="ctr"/>
-                      <a:endParaRPr lang="en-US" dirty="0"/>
+                      <a:r>
+                        <a:rPr lang="en-US" dirty="0"/>
+                        <a:t>0.804</a:t>
+                      </a:r>
+                    </a:p>
+                  </a:txBody>
+                  <a:tcPr anchor="ctr"/>
+                </a:tc>
+                <a:tc>
+                  <a:txBody>
+                    <a:bodyPr/>
+                    <a:lstStyle/>
+                    <a:p>
+                      <a:pPr algn="ctr"/>
+                      <a:r>
+                        <a:rPr lang="en-US" dirty="0"/>
+                        <a:t>0.759</a:t>
+                      </a:r>
+                    </a:p>
+                  </a:txBody>
+                  <a:tcPr anchor="ctr"/>
+                </a:tc>
+                <a:tc>
+                  <a:txBody>
+                    <a:bodyPr/>
+                    <a:lstStyle/>
+                    <a:p>
+                      <a:pPr algn="ctr"/>
+                      <a:r>
+                        <a:rPr lang="en-US" dirty="0"/>
+                        <a:t>0.754</a:t>
+                      </a:r>
+                    </a:p>
+                  </a:txBody>
+                  <a:tcPr anchor="ctr"/>
+                </a:tc>
+                <a:tc>
+                  <a:txBody>
+                    <a:bodyPr/>
+                    <a:lstStyle/>
+                    <a:p>
+                      <a:pPr algn="ctr"/>
+                      <a:r>
+                        <a:rPr lang="en-US" dirty="0"/>
+                        <a:t>0.839</a:t>
+                      </a:r>
+                    </a:p>
+                  </a:txBody>
+                  <a:tcPr anchor="ctr"/>
+                </a:tc>
+                <a:tc>
+                  <a:txBody>
+                    <a:bodyPr/>
+                    <a:lstStyle/>
+                    <a:p>
+                      <a:pPr algn="ctr"/>
+                      <a:r>
+                        <a:rPr lang="en-US" dirty="0"/>
+                        <a:t>0.756</a:t>
+                      </a:r>
+                    </a:p>
+                  </a:txBody>
+                  <a:tcPr anchor="ctr"/>
+                </a:tc>
+                <a:tc>
+                  <a:txBody>
+                    <a:bodyPr/>
+                    <a:lstStyle/>
+                    <a:p>
+                      <a:pPr algn="ctr"/>
+                      <a:r>
+                        <a:rPr lang="en-US" dirty="0"/>
+                        <a:t>0.4504</a:t>
+                      </a:r>
                     </a:p>
                   </a:txBody>
                   <a:tcPr anchor="ctr"/>
@@ -46064,62 +46236,80 @@
                     <a:lstStyle/>
                     <a:p>
                       <a:pPr algn="ctr"/>
-                      <a:endParaRPr lang="en-US" dirty="0"/>
-                    </a:p>
-                  </a:txBody>
-                  <a:tcPr anchor="ctr"/>
-                </a:tc>
-                <a:tc>
-                  <a:txBody>
-                    <a:bodyPr/>
-                    <a:lstStyle/>
-                    <a:p>
-                      <a:pPr algn="ctr"/>
-                      <a:endParaRPr lang="en-US" dirty="0"/>
-                    </a:p>
-                  </a:txBody>
-                  <a:tcPr anchor="ctr"/>
-                </a:tc>
-                <a:tc>
-                  <a:txBody>
-                    <a:bodyPr/>
-                    <a:lstStyle/>
-                    <a:p>
-                      <a:pPr algn="ctr"/>
-                      <a:endParaRPr lang="en-US" dirty="0"/>
-                    </a:p>
-                  </a:txBody>
-                  <a:tcPr anchor="ctr"/>
-                </a:tc>
-                <a:tc>
-                  <a:txBody>
-                    <a:bodyPr/>
-                    <a:lstStyle/>
-                    <a:p>
-                      <a:pPr algn="ctr"/>
-                      <a:endParaRPr lang="en-US" dirty="0"/>
-                    </a:p>
-                  </a:txBody>
-                  <a:tcPr anchor="ctr"/>
-                </a:tc>
-                <a:tc>
-                  <a:txBody>
-                    <a:bodyPr/>
-                    <a:lstStyle/>
-                    <a:p>
-                      <a:pPr algn="ctr"/>
-                      <a:endParaRPr lang="en-US" dirty="0"/>
-                    </a:p>
-                  </a:txBody>
-                  <a:tcPr anchor="ctr"/>
-                </a:tc>
-                <a:tc>
-                  <a:txBody>
-                    <a:bodyPr/>
-                    <a:lstStyle/>
-                    <a:p>
-                      <a:pPr algn="ctr"/>
-                      <a:endParaRPr lang="en-US" dirty="0"/>
+                      <a:r>
+                        <a:rPr lang="en-US" dirty="0"/>
+                        <a:t>0.803</a:t>
+                      </a:r>
+                    </a:p>
+                  </a:txBody>
+                  <a:tcPr anchor="ctr"/>
+                </a:tc>
+                <a:tc>
+                  <a:txBody>
+                    <a:bodyPr/>
+                    <a:lstStyle/>
+                    <a:p>
+                      <a:pPr algn="ctr"/>
+                      <a:r>
+                        <a:rPr lang="en-US" dirty="0"/>
+                        <a:t>0.785</a:t>
+                      </a:r>
+                    </a:p>
+                  </a:txBody>
+                  <a:tcPr anchor="ctr"/>
+                </a:tc>
+                <a:tc>
+                  <a:txBody>
+                    <a:bodyPr/>
+                    <a:lstStyle/>
+                    <a:p>
+                      <a:pPr algn="ctr"/>
+                      <a:r>
+                        <a:rPr lang="en-US" dirty="0"/>
+                        <a:t>0.702</a:t>
+                      </a:r>
+                    </a:p>
+                  </a:txBody>
+                  <a:tcPr anchor="ctr"/>
+                </a:tc>
+                <a:tc>
+                  <a:txBody>
+                    <a:bodyPr/>
+                    <a:lstStyle/>
+                    <a:p>
+                      <a:pPr algn="ctr"/>
+                      <a:r>
+                        <a:rPr lang="en-US" dirty="0"/>
+                        <a:t>0.871</a:t>
+                      </a:r>
+                    </a:p>
+                  </a:txBody>
+                  <a:tcPr anchor="ctr"/>
+                </a:tc>
+                <a:tc>
+                  <a:txBody>
+                    <a:bodyPr/>
+                    <a:lstStyle/>
+                    <a:p>
+                      <a:pPr algn="ctr"/>
+                      <a:r>
+                        <a:rPr lang="en-US" dirty="0"/>
+                        <a:t>0.741</a:t>
+                      </a:r>
+                    </a:p>
+                  </a:txBody>
+                  <a:tcPr anchor="ctr"/>
+                </a:tc>
+                <a:tc>
+                  <a:txBody>
+                    <a:bodyPr/>
+                    <a:lstStyle/>
+                    <a:p>
+                      <a:pPr algn="ctr"/>
+                      <a:r>
+                        <a:rPr lang="en-US" dirty="0"/>
+                        <a:t>0.4566</a:t>
+                      </a:r>
                     </a:p>
                   </a:txBody>
                   <a:tcPr anchor="ctr"/>
@@ -50300,7 +50490,11 @@
             <a:graphicFrameLocks noGrp="1"/>
           </p:cNvGraphicFramePr>
           <p:nvPr>
-            <p:extLst/>
+            <p:extLst>
+              <p:ext uri="{D42A27DB-BD31-4B8C-83A1-F6EECF244321}">
+                <p14:modId xmlns:p14="http://schemas.microsoft.com/office/powerpoint/2010/main" val="2971206323"/>
+              </p:ext>
+            </p:extLst>
           </p:nvPr>
         </p:nvGraphicFramePr>
         <p:xfrm>
@@ -50491,62 +50685,80 @@
                     <a:lstStyle/>
                     <a:p>
                       <a:pPr algn="ctr"/>
-                      <a:endParaRPr lang="en-US" dirty="0"/>
-                    </a:p>
-                  </a:txBody>
-                  <a:tcPr anchor="ctr"/>
-                </a:tc>
-                <a:tc>
-                  <a:txBody>
-                    <a:bodyPr/>
-                    <a:lstStyle/>
-                    <a:p>
-                      <a:pPr algn="ctr"/>
-                      <a:endParaRPr lang="en-US" dirty="0"/>
-                    </a:p>
-                  </a:txBody>
-                  <a:tcPr anchor="ctr"/>
-                </a:tc>
-                <a:tc>
-                  <a:txBody>
-                    <a:bodyPr/>
-                    <a:lstStyle/>
-                    <a:p>
-                      <a:pPr algn="ctr"/>
-                      <a:endParaRPr lang="en-US" dirty="0"/>
-                    </a:p>
-                  </a:txBody>
-                  <a:tcPr anchor="ctr"/>
-                </a:tc>
-                <a:tc>
-                  <a:txBody>
-                    <a:bodyPr/>
-                    <a:lstStyle/>
-                    <a:p>
-                      <a:pPr algn="ctr"/>
-                      <a:endParaRPr lang="en-US" dirty="0"/>
-                    </a:p>
-                  </a:txBody>
-                  <a:tcPr anchor="ctr"/>
-                </a:tc>
-                <a:tc>
-                  <a:txBody>
-                    <a:bodyPr/>
-                    <a:lstStyle/>
-                    <a:p>
-                      <a:pPr algn="ctr"/>
-                      <a:endParaRPr lang="en-US" dirty="0"/>
-                    </a:p>
-                  </a:txBody>
-                  <a:tcPr anchor="ctr"/>
-                </a:tc>
-                <a:tc>
-                  <a:txBody>
-                    <a:bodyPr/>
-                    <a:lstStyle/>
-                    <a:p>
-                      <a:pPr algn="ctr"/>
-                      <a:endParaRPr lang="en-US" dirty="0"/>
+                      <a:r>
+                        <a:rPr lang="en-US" dirty="0"/>
+                        <a:t>0.869</a:t>
+                      </a:r>
+                    </a:p>
+                  </a:txBody>
+                  <a:tcPr anchor="ctr"/>
+                </a:tc>
+                <a:tc>
+                  <a:txBody>
+                    <a:bodyPr/>
+                    <a:lstStyle/>
+                    <a:p>
+                      <a:pPr algn="ctr"/>
+                      <a:r>
+                        <a:rPr lang="en-US" dirty="0"/>
+                        <a:t>0.858</a:t>
+                      </a:r>
+                    </a:p>
+                  </a:txBody>
+                  <a:tcPr anchor="ctr"/>
+                </a:tc>
+                <a:tc>
+                  <a:txBody>
+                    <a:bodyPr/>
+                    <a:lstStyle/>
+                    <a:p>
+                      <a:pPr algn="ctr"/>
+                      <a:r>
+                        <a:rPr lang="en-US" dirty="0"/>
+                        <a:t>0.834</a:t>
+                      </a:r>
+                    </a:p>
+                  </a:txBody>
+                  <a:tcPr anchor="ctr"/>
+                </a:tc>
+                <a:tc>
+                  <a:txBody>
+                    <a:bodyPr/>
+                    <a:lstStyle/>
+                    <a:p>
+                      <a:pPr algn="ctr"/>
+                      <a:r>
+                        <a:rPr lang="en-US" dirty="0"/>
+                        <a:t>0.896</a:t>
+                      </a:r>
+                    </a:p>
+                  </a:txBody>
+                  <a:tcPr anchor="ctr"/>
+                </a:tc>
+                <a:tc>
+                  <a:txBody>
+                    <a:bodyPr/>
+                    <a:lstStyle/>
+                    <a:p>
+                      <a:pPr algn="ctr"/>
+                      <a:r>
+                        <a:rPr lang="en-US" dirty="0"/>
+                        <a:t>0.846</a:t>
+                      </a:r>
+                    </a:p>
+                  </a:txBody>
+                  <a:tcPr anchor="ctr"/>
+                </a:tc>
+                <a:tc>
+                  <a:txBody>
+                    <a:bodyPr/>
+                    <a:lstStyle/>
+                    <a:p>
+                      <a:pPr algn="ctr"/>
+                      <a:r>
+                        <a:rPr lang="en-US" dirty="0"/>
+                        <a:t>0.3363</a:t>
+                      </a:r>
                     </a:p>
                   </a:txBody>
                   <a:tcPr anchor="ctr"/>
@@ -50579,62 +50791,80 @@
                     <a:lstStyle/>
                     <a:p>
                       <a:pPr algn="ctr"/>
-                      <a:endParaRPr lang="en-US" dirty="0"/>
-                    </a:p>
-                  </a:txBody>
-                  <a:tcPr anchor="ctr"/>
-                </a:tc>
-                <a:tc>
-                  <a:txBody>
-                    <a:bodyPr/>
-                    <a:lstStyle/>
-                    <a:p>
-                      <a:pPr algn="ctr"/>
-                      <a:endParaRPr lang="en-US" dirty="0"/>
-                    </a:p>
-                  </a:txBody>
-                  <a:tcPr anchor="ctr"/>
-                </a:tc>
-                <a:tc>
-                  <a:txBody>
-                    <a:bodyPr/>
-                    <a:lstStyle/>
-                    <a:p>
-                      <a:pPr algn="ctr"/>
-                      <a:endParaRPr lang="en-US" dirty="0"/>
-                    </a:p>
-                  </a:txBody>
-                  <a:tcPr anchor="ctr"/>
-                </a:tc>
-                <a:tc>
-                  <a:txBody>
-                    <a:bodyPr/>
-                    <a:lstStyle/>
-                    <a:p>
-                      <a:pPr algn="ctr"/>
-                      <a:endParaRPr lang="en-US" dirty="0"/>
-                    </a:p>
-                  </a:txBody>
-                  <a:tcPr anchor="ctr"/>
-                </a:tc>
-                <a:tc>
-                  <a:txBody>
-                    <a:bodyPr/>
-                    <a:lstStyle/>
-                    <a:p>
-                      <a:pPr algn="ctr"/>
-                      <a:endParaRPr lang="en-US" dirty="0"/>
-                    </a:p>
-                  </a:txBody>
-                  <a:tcPr anchor="ctr"/>
-                </a:tc>
-                <a:tc>
-                  <a:txBody>
-                    <a:bodyPr/>
-                    <a:lstStyle/>
-                    <a:p>
-                      <a:pPr algn="ctr"/>
-                      <a:endParaRPr lang="en-US" dirty="0"/>
+                      <a:r>
+                        <a:rPr lang="en-US" dirty="0"/>
+                        <a:t>0.868</a:t>
+                      </a:r>
+                    </a:p>
+                  </a:txBody>
+                  <a:tcPr anchor="ctr"/>
+                </a:tc>
+                <a:tc>
+                  <a:txBody>
+                    <a:bodyPr/>
+                    <a:lstStyle/>
+                    <a:p>
+                      <a:pPr algn="ctr"/>
+                      <a:r>
+                        <a:rPr lang="en-US" dirty="0"/>
+                        <a:t>0.901</a:t>
+                      </a:r>
+                    </a:p>
+                  </a:txBody>
+                  <a:tcPr anchor="ctr"/>
+                </a:tc>
+                <a:tc>
+                  <a:txBody>
+                    <a:bodyPr/>
+                    <a:lstStyle/>
+                    <a:p>
+                      <a:pPr algn="ctr"/>
+                      <a:r>
+                        <a:rPr lang="en-US" dirty="0"/>
+                        <a:t>0.779</a:t>
+                      </a:r>
+                    </a:p>
+                  </a:txBody>
+                  <a:tcPr anchor="ctr"/>
+                </a:tc>
+                <a:tc>
+                  <a:txBody>
+                    <a:bodyPr/>
+                    <a:lstStyle/>
+                    <a:p>
+                      <a:pPr algn="ctr"/>
+                      <a:r>
+                        <a:rPr lang="en-US" dirty="0"/>
+                        <a:t>0.935</a:t>
+                      </a:r>
+                    </a:p>
+                  </a:txBody>
+                  <a:tcPr anchor="ctr"/>
+                </a:tc>
+                <a:tc>
+                  <a:txBody>
+                    <a:bodyPr/>
+                    <a:lstStyle/>
+                    <a:p>
+                      <a:pPr algn="ctr"/>
+                      <a:r>
+                        <a:rPr lang="en-US" dirty="0"/>
+                        <a:t>0.835</a:t>
+                      </a:r>
+                    </a:p>
+                  </a:txBody>
+                  <a:tcPr anchor="ctr"/>
+                </a:tc>
+                <a:tc>
+                  <a:txBody>
+                    <a:bodyPr/>
+                    <a:lstStyle/>
+                    <a:p>
+                      <a:pPr algn="ctr"/>
+                      <a:r>
+                        <a:rPr lang="en-US" dirty="0"/>
+                        <a:t>0.3289</a:t>
+                      </a:r>
                     </a:p>
                   </a:txBody>
                   <a:tcPr anchor="ctr"/>
@@ -50671,86 +50901,104 @@
                     <a:lstStyle/>
                     <a:p>
                       <a:pPr algn="ctr"/>
-                      <a:endParaRPr lang="en-US" dirty="0">
-                        <a:solidFill>
-                          <a:srgbClr val="FF0000"/>
-                        </a:solidFill>
-                      </a:endParaRPr>
-                    </a:p>
-                  </a:txBody>
-                  <a:tcPr anchor="ctr"/>
-                </a:tc>
-                <a:tc>
-                  <a:txBody>
-                    <a:bodyPr/>
-                    <a:lstStyle/>
-                    <a:p>
-                      <a:pPr algn="ctr"/>
-                      <a:endParaRPr lang="en-US" dirty="0">
-                        <a:solidFill>
-                          <a:srgbClr val="FF0000"/>
-                        </a:solidFill>
-                      </a:endParaRPr>
-                    </a:p>
-                  </a:txBody>
-                  <a:tcPr anchor="ctr"/>
-                </a:tc>
-                <a:tc>
-                  <a:txBody>
-                    <a:bodyPr/>
-                    <a:lstStyle/>
-                    <a:p>
-                      <a:pPr algn="ctr"/>
-                      <a:endParaRPr lang="en-US" dirty="0">
-                        <a:solidFill>
-                          <a:srgbClr val="FF0000"/>
-                        </a:solidFill>
-                      </a:endParaRPr>
-                    </a:p>
-                  </a:txBody>
-                  <a:tcPr anchor="ctr"/>
-                </a:tc>
-                <a:tc>
-                  <a:txBody>
-                    <a:bodyPr/>
-                    <a:lstStyle/>
-                    <a:p>
-                      <a:pPr algn="ctr"/>
-                      <a:endParaRPr lang="en-US" dirty="0">
-                        <a:solidFill>
-                          <a:srgbClr val="FF0000"/>
-                        </a:solidFill>
-                      </a:endParaRPr>
-                    </a:p>
-                  </a:txBody>
-                  <a:tcPr anchor="ctr"/>
-                </a:tc>
-                <a:tc>
-                  <a:txBody>
-                    <a:bodyPr/>
-                    <a:lstStyle/>
-                    <a:p>
-                      <a:pPr algn="ctr"/>
-                      <a:endParaRPr lang="en-US" dirty="0">
-                        <a:solidFill>
-                          <a:srgbClr val="FF0000"/>
-                        </a:solidFill>
-                      </a:endParaRPr>
-                    </a:p>
-                  </a:txBody>
-                  <a:tcPr anchor="ctr"/>
-                </a:tc>
-                <a:tc>
-                  <a:txBody>
-                    <a:bodyPr/>
-                    <a:lstStyle/>
-                    <a:p>
-                      <a:pPr algn="ctr"/>
-                      <a:endParaRPr lang="en-US" dirty="0">
-                        <a:solidFill>
-                          <a:srgbClr val="FF0000"/>
-                        </a:solidFill>
-                      </a:endParaRPr>
+                      <a:r>
+                        <a:rPr lang="en-US" dirty="0">
+                          <a:solidFill>
+                            <a:srgbClr val="FF0000"/>
+                          </a:solidFill>
+                        </a:rPr>
+                        <a:t>0.838</a:t>
+                      </a:r>
+                    </a:p>
+                  </a:txBody>
+                  <a:tcPr anchor="ctr"/>
+                </a:tc>
+                <a:tc>
+                  <a:txBody>
+                    <a:bodyPr/>
+                    <a:lstStyle/>
+                    <a:p>
+                      <a:pPr algn="ctr"/>
+                      <a:r>
+                        <a:rPr lang="en-US" dirty="0">
+                          <a:solidFill>
+                            <a:srgbClr val="FF0000"/>
+                          </a:solidFill>
+                        </a:rPr>
+                        <a:t>0.780</a:t>
+                      </a:r>
+                    </a:p>
+                  </a:txBody>
+                  <a:tcPr anchor="ctr"/>
+                </a:tc>
+                <a:tc>
+                  <a:txBody>
+                    <a:bodyPr/>
+                    <a:lstStyle/>
+                    <a:p>
+                      <a:pPr algn="ctr"/>
+                      <a:r>
+                        <a:rPr lang="en-US" dirty="0">
+                          <a:solidFill>
+                            <a:srgbClr val="FF0000"/>
+                          </a:solidFill>
+                        </a:rPr>
+                        <a:t>0.866</a:t>
+                      </a:r>
+                    </a:p>
+                  </a:txBody>
+                  <a:tcPr anchor="ctr"/>
+                </a:tc>
+                <a:tc>
+                  <a:txBody>
+                    <a:bodyPr/>
+                    <a:lstStyle/>
+                    <a:p>
+                      <a:pPr algn="ctr"/>
+                      <a:r>
+                        <a:rPr lang="en-US" dirty="0">
+                          <a:solidFill>
+                            <a:srgbClr val="FF0000"/>
+                          </a:solidFill>
+                        </a:rPr>
+                        <a:t>0.816</a:t>
+                      </a:r>
+                    </a:p>
+                  </a:txBody>
+                  <a:tcPr anchor="ctr"/>
+                </a:tc>
+                <a:tc>
+                  <a:txBody>
+                    <a:bodyPr/>
+                    <a:lstStyle/>
+                    <a:p>
+                      <a:pPr algn="ctr"/>
+                      <a:r>
+                        <a:rPr lang="en-US" dirty="0">
+                          <a:solidFill>
+                            <a:srgbClr val="FF0000"/>
+                          </a:solidFill>
+                        </a:rPr>
+                        <a:t>0.821</a:t>
+                      </a:r>
+                    </a:p>
+                  </a:txBody>
+                  <a:tcPr anchor="ctr"/>
+                </a:tc>
+                <a:tc>
+                  <a:txBody>
+                    <a:bodyPr/>
+                    <a:lstStyle/>
+                    <a:p>
+                      <a:pPr algn="ctr"/>
+                      <a:r>
+                        <a:rPr lang="en-US" dirty="0">
+                          <a:solidFill>
+                            <a:srgbClr val="FF0000"/>
+                          </a:solidFill>
+                        </a:rPr>
+                        <a:t>0.8072</a:t>
+                      </a:r>
                     </a:p>
                   </a:txBody>
                   <a:tcPr anchor="ctr"/>
@@ -50782,62 +51030,80 @@
                     <a:lstStyle/>
                     <a:p>
                       <a:pPr algn="ctr"/>
-                      <a:endParaRPr lang="en-US" dirty="0"/>
-                    </a:p>
-                  </a:txBody>
-                  <a:tcPr anchor="ctr"/>
-                </a:tc>
-                <a:tc>
-                  <a:txBody>
-                    <a:bodyPr/>
-                    <a:lstStyle/>
-                    <a:p>
-                      <a:pPr algn="ctr"/>
-                      <a:endParaRPr lang="en-US" dirty="0"/>
-                    </a:p>
-                  </a:txBody>
-                  <a:tcPr anchor="ctr"/>
-                </a:tc>
-                <a:tc>
-                  <a:txBody>
-                    <a:bodyPr/>
-                    <a:lstStyle/>
-                    <a:p>
-                      <a:pPr algn="ctr"/>
-                      <a:endParaRPr lang="en-US" dirty="0"/>
-                    </a:p>
-                  </a:txBody>
-                  <a:tcPr anchor="ctr"/>
-                </a:tc>
-                <a:tc>
-                  <a:txBody>
-                    <a:bodyPr/>
-                    <a:lstStyle/>
-                    <a:p>
-                      <a:pPr algn="ctr"/>
-                      <a:endParaRPr lang="en-US" dirty="0"/>
-                    </a:p>
-                  </a:txBody>
-                  <a:tcPr anchor="ctr"/>
-                </a:tc>
-                <a:tc>
-                  <a:txBody>
-                    <a:bodyPr/>
-                    <a:lstStyle/>
-                    <a:p>
-                      <a:pPr algn="ctr"/>
-                      <a:endParaRPr lang="en-US" dirty="0"/>
-                    </a:p>
-                  </a:txBody>
-                  <a:tcPr anchor="ctr"/>
-                </a:tc>
-                <a:tc>
-                  <a:txBody>
-                    <a:bodyPr/>
-                    <a:lstStyle/>
-                    <a:p>
-                      <a:pPr algn="ctr"/>
-                      <a:endParaRPr lang="en-US" dirty="0"/>
+                      <a:r>
+                        <a:rPr lang="en-US" dirty="0"/>
+                        <a:t>0.869</a:t>
+                      </a:r>
+                    </a:p>
+                  </a:txBody>
+                  <a:tcPr anchor="ctr"/>
+                </a:tc>
+                <a:tc>
+                  <a:txBody>
+                    <a:bodyPr/>
+                    <a:lstStyle/>
+                    <a:p>
+                      <a:pPr algn="ctr"/>
+                      <a:r>
+                        <a:rPr lang="en-US" dirty="0"/>
+                        <a:t>0.858</a:t>
+                      </a:r>
+                    </a:p>
+                  </a:txBody>
+                  <a:tcPr anchor="ctr"/>
+                </a:tc>
+                <a:tc>
+                  <a:txBody>
+                    <a:bodyPr/>
+                    <a:lstStyle/>
+                    <a:p>
+                      <a:pPr algn="ctr"/>
+                      <a:r>
+                        <a:rPr lang="en-US" dirty="0"/>
+                        <a:t>0.834</a:t>
+                      </a:r>
+                    </a:p>
+                  </a:txBody>
+                  <a:tcPr anchor="ctr"/>
+                </a:tc>
+                <a:tc>
+                  <a:txBody>
+                    <a:bodyPr/>
+                    <a:lstStyle/>
+                    <a:p>
+                      <a:pPr algn="ctr"/>
+                      <a:r>
+                        <a:rPr lang="en-US" dirty="0"/>
+                        <a:t>0.896</a:t>
+                      </a:r>
+                    </a:p>
+                  </a:txBody>
+                  <a:tcPr anchor="ctr"/>
+                </a:tc>
+                <a:tc>
+                  <a:txBody>
+                    <a:bodyPr/>
+                    <a:lstStyle/>
+                    <a:p>
+                      <a:pPr algn="ctr"/>
+                      <a:r>
+                        <a:rPr lang="en-US" dirty="0"/>
+                        <a:t>0.846</a:t>
+                      </a:r>
+                    </a:p>
+                  </a:txBody>
+                  <a:tcPr anchor="ctr"/>
+                </a:tc>
+                <a:tc>
+                  <a:txBody>
+                    <a:bodyPr/>
+                    <a:lstStyle/>
+                    <a:p>
+                      <a:pPr algn="ctr"/>
+                      <a:r>
+                        <a:rPr lang="en-US" dirty="0"/>
+                        <a:t>0.3363</a:t>
+                      </a:r>
                     </a:p>
                   </a:txBody>
                   <a:tcPr anchor="ctr"/>
@@ -50890,62 +51156,80 @@
                     <a:lstStyle/>
                     <a:p>
                       <a:pPr algn="ctr"/>
-                      <a:endParaRPr lang="en-US" dirty="0"/>
-                    </a:p>
-                  </a:txBody>
-                  <a:tcPr anchor="ctr"/>
-                </a:tc>
-                <a:tc>
-                  <a:txBody>
-                    <a:bodyPr/>
-                    <a:lstStyle/>
-                    <a:p>
-                      <a:pPr algn="ctr"/>
-                      <a:endParaRPr lang="en-US" dirty="0"/>
-                    </a:p>
-                  </a:txBody>
-                  <a:tcPr anchor="ctr"/>
-                </a:tc>
-                <a:tc>
-                  <a:txBody>
-                    <a:bodyPr/>
-                    <a:lstStyle/>
-                    <a:p>
-                      <a:pPr algn="ctr"/>
-                      <a:endParaRPr lang="en-US" dirty="0"/>
-                    </a:p>
-                  </a:txBody>
-                  <a:tcPr anchor="ctr"/>
-                </a:tc>
-                <a:tc>
-                  <a:txBody>
-                    <a:bodyPr/>
-                    <a:lstStyle/>
-                    <a:p>
-                      <a:pPr algn="ctr"/>
-                      <a:endParaRPr lang="en-US" dirty="0"/>
-                    </a:p>
-                  </a:txBody>
-                  <a:tcPr anchor="ctr"/>
-                </a:tc>
-                <a:tc>
-                  <a:txBody>
-                    <a:bodyPr/>
-                    <a:lstStyle/>
-                    <a:p>
-                      <a:pPr algn="ctr"/>
-                      <a:endParaRPr lang="en-US" dirty="0"/>
-                    </a:p>
-                  </a:txBody>
-                  <a:tcPr anchor="ctr"/>
-                </a:tc>
-                <a:tc>
-                  <a:txBody>
-                    <a:bodyPr/>
-                    <a:lstStyle/>
-                    <a:p>
-                      <a:pPr algn="ctr"/>
-                      <a:endParaRPr lang="en-US" dirty="0"/>
+                      <a:r>
+                        <a:rPr lang="en-US" dirty="0"/>
+                        <a:t>0.867</a:t>
+                      </a:r>
+                    </a:p>
+                  </a:txBody>
+                  <a:tcPr anchor="ctr"/>
+                </a:tc>
+                <a:tc>
+                  <a:txBody>
+                    <a:bodyPr/>
+                    <a:lstStyle/>
+                    <a:p>
+                      <a:pPr algn="ctr"/>
+                      <a:r>
+                        <a:rPr lang="en-US" dirty="0"/>
+                        <a:t>0.875</a:t>
+                      </a:r>
+                    </a:p>
+                  </a:txBody>
+                  <a:tcPr anchor="ctr"/>
+                </a:tc>
+                <a:tc>
+                  <a:txBody>
+                    <a:bodyPr/>
+                    <a:lstStyle/>
+                    <a:p>
+                      <a:pPr algn="ctr"/>
+                      <a:r>
+                        <a:rPr lang="en-US" dirty="0"/>
+                        <a:t>0.806</a:t>
+                      </a:r>
+                    </a:p>
+                  </a:txBody>
+                  <a:tcPr anchor="ctr"/>
+                </a:tc>
+                <a:tc>
+                  <a:txBody>
+                    <a:bodyPr/>
+                    <a:lstStyle/>
+                    <a:p>
+                      <a:pPr algn="ctr"/>
+                      <a:r>
+                        <a:rPr lang="en-US" dirty="0"/>
+                        <a:t>0.913</a:t>
+                      </a:r>
+                    </a:p>
+                  </a:txBody>
+                  <a:tcPr anchor="ctr"/>
+                </a:tc>
+                <a:tc>
+                  <a:txBody>
+                    <a:bodyPr/>
+                    <a:lstStyle/>
+                    <a:p>
+                      <a:pPr algn="ctr"/>
+                      <a:r>
+                        <a:rPr lang="en-US" dirty="0"/>
+                        <a:t>0.839</a:t>
+                      </a:r>
+                    </a:p>
+                  </a:txBody>
+                  <a:tcPr anchor="ctr"/>
+                </a:tc>
+                <a:tc>
+                  <a:txBody>
+                    <a:bodyPr/>
+                    <a:lstStyle/>
+                    <a:p>
+                      <a:pPr algn="ctr"/>
+                      <a:r>
+                        <a:rPr lang="en-US" dirty="0"/>
+                        <a:t>0.3305</a:t>
+                      </a:r>
                     </a:p>
                   </a:txBody>
                   <a:tcPr anchor="ctr"/>

</xml_diff>